<commit_message>
First draft of Module 08 completed
</commit_message>
<xml_diff>
--- a/Slides/Lesson 8.6 Integer Square Root.pptx
+++ b/Slides/Lesson 8.6 Integer Square Root.pptx
@@ -239,7 +239,7 @@
             <a:fld id="{CF8F25F6-E1EF-4065-8525-42EDEBD9BD22}" type="datetimeFigureOut">
               <a:rPr lang="en-US" smtClean="0"/>
               <a:pPr/>
-              <a:t>10/26/2015</a:t>
+              <a:t>10/25/2016</a:t>
             </a:fld>
             <a:endParaRPr lang="en-US"/>
           </a:p>
@@ -305,38 +305,37 @@
           <a:p>
             <a:pPr lvl="0"/>
             <a:r>
-              <a:rPr lang="en-US" smtClean="0"/>
+              <a:rPr lang="en-US"/>
               <a:t>Click to edit Master text styles</a:t>
             </a:r>
           </a:p>
           <a:p>
             <a:pPr lvl="1"/>
             <a:r>
-              <a:rPr lang="en-US" smtClean="0"/>
+              <a:rPr lang="en-US"/>
               <a:t>Second level</a:t>
             </a:r>
           </a:p>
           <a:p>
             <a:pPr lvl="2"/>
             <a:r>
-              <a:rPr lang="en-US" smtClean="0"/>
+              <a:rPr lang="en-US"/>
               <a:t>Third level</a:t>
             </a:r>
           </a:p>
           <a:p>
             <a:pPr lvl="3"/>
             <a:r>
-              <a:rPr lang="en-US" smtClean="0"/>
+              <a:rPr lang="en-US"/>
               <a:t>Fourth level</a:t>
             </a:r>
           </a:p>
           <a:p>
             <a:pPr lvl="4"/>
             <a:r>
-              <a:rPr lang="en-US" smtClean="0"/>
+              <a:rPr lang="en-US"/>
               <a:t>Fifth level</a:t>
             </a:r>
-            <a:endParaRPr lang="en-US"/>
           </a:p>
         </p:txBody>
       </p:sp>
@@ -556,7 +555,7 @@
           </a:bodyPr>
           <a:lstStyle/>
           <a:p>
-            <a:endParaRPr lang="en-US" dirty="0" smtClean="0"/>
+            <a:endParaRPr lang="en-US" dirty="0"/>
           </a:p>
         </p:txBody>
       </p:sp>
@@ -635,10 +634,9 @@
           <a:lstStyle/>
           <a:p>
             <a:r>
-              <a:rPr lang="en-US" smtClean="0"/>
+              <a:rPr lang="en-US"/>
               <a:t>Click to edit Master title style</a:t>
             </a:r>
-            <a:endParaRPr lang="en-US"/>
           </a:p>
         </p:txBody>
       </p:sp>
@@ -754,10 +752,9 @@
           </a:lstStyle>
           <a:p>
             <a:r>
-              <a:rPr lang="en-US" smtClean="0"/>
+              <a:rPr lang="en-US"/>
               <a:t>Click to edit Master subtitle style</a:t>
             </a:r>
-            <a:endParaRPr lang="en-US"/>
           </a:p>
         </p:txBody>
       </p:sp>
@@ -778,7 +775,7 @@
           <a:p>
             <a:fld id="{2F1F79F5-7BEC-496A-AFC7-876E38F64D71}" type="datetime1">
               <a:rPr lang="en-US" smtClean="0"/>
-              <a:t>10/26/2015</a:t>
+              <a:t>10/25/2016</a:t>
             </a:fld>
             <a:endParaRPr lang="en-US"/>
           </a:p>
@@ -836,13 +833,6 @@
   <p:clrMapOvr>
     <a:masterClrMapping/>
   </p:clrMapOvr>
-  <p:timing>
-    <p:tnLst>
-      <p:par>
-        <p:cTn id="1" dur="indefinite" restart="never" nodeType="tmRoot"/>
-      </p:par>
-    </p:tnLst>
-  </p:timing>
 </p:sldLayout>
 </file>
 
@@ -880,7 +870,7 @@
           <a:p>
             <a:fld id="{0A05703A-7669-4FEA-9056-25299B4D29D4}" type="datetime1">
               <a:rPr lang="en-US" smtClean="0"/>
-              <a:t>10/26/2015</a:t>
+              <a:t>10/25/2016</a:t>
             </a:fld>
             <a:endParaRPr lang="en-US"/>
           </a:p>
@@ -983,10 +973,9 @@
           </a:lstStyle>
           <a:p>
             <a:r>
-              <a:rPr lang="en-US" smtClean="0"/>
+              <a:rPr lang="en-US"/>
               <a:t>Click to edit Master title style</a:t>
             </a:r>
-            <a:endParaRPr lang="en-US"/>
           </a:p>
         </p:txBody>
       </p:sp>
@@ -1040,38 +1029,37 @@
           <a:p>
             <a:pPr lvl="0"/>
             <a:r>
-              <a:rPr lang="en-US" smtClean="0"/>
+              <a:rPr lang="en-US"/>
               <a:t>Click to edit Master text styles</a:t>
             </a:r>
           </a:p>
           <a:p>
             <a:pPr lvl="1"/>
             <a:r>
-              <a:rPr lang="en-US" smtClean="0"/>
+              <a:rPr lang="en-US"/>
               <a:t>Second level</a:t>
             </a:r>
           </a:p>
           <a:p>
             <a:pPr lvl="2"/>
             <a:r>
-              <a:rPr lang="en-US" smtClean="0"/>
+              <a:rPr lang="en-US"/>
               <a:t>Third level</a:t>
             </a:r>
           </a:p>
           <a:p>
             <a:pPr lvl="3"/>
             <a:r>
-              <a:rPr lang="en-US" smtClean="0"/>
+              <a:rPr lang="en-US"/>
               <a:t>Fourth level</a:t>
             </a:r>
           </a:p>
           <a:p>
             <a:pPr lvl="4"/>
             <a:r>
-              <a:rPr lang="en-US" smtClean="0"/>
+              <a:rPr lang="en-US"/>
               <a:t>Fifth level</a:t>
             </a:r>
-            <a:endParaRPr lang="en-US"/>
           </a:p>
         </p:txBody>
       </p:sp>
@@ -1134,7 +1122,7 @@
           <a:p>
             <a:pPr lvl="0"/>
             <a:r>
-              <a:rPr lang="en-US" smtClean="0"/>
+              <a:rPr lang="en-US"/>
               <a:t>Click to edit Master text styles</a:t>
             </a:r>
           </a:p>
@@ -1157,7 +1145,7 @@
           <a:p>
             <a:fld id="{6E5077B5-BB57-49DB-88CA-226A139E5C01}" type="datetime1">
               <a:rPr lang="en-US" smtClean="0"/>
-              <a:t>10/26/2015</a:t>
+              <a:t>10/25/2016</a:t>
             </a:fld>
             <a:endParaRPr lang="en-US"/>
           </a:p>
@@ -1260,10 +1248,9 @@
           </a:lstStyle>
           <a:p>
             <a:r>
-              <a:rPr lang="en-US" smtClean="0"/>
+              <a:rPr lang="en-US"/>
               <a:t>Click to edit Master title style</a:t>
             </a:r>
-            <a:endParaRPr lang="en-US"/>
           </a:p>
         </p:txBody>
       </p:sp>
@@ -1387,7 +1374,7 @@
           <a:p>
             <a:pPr lvl="0"/>
             <a:r>
-              <a:rPr lang="en-US" smtClean="0"/>
+              <a:rPr lang="en-US"/>
               <a:t>Click to edit Master text styles</a:t>
             </a:r>
           </a:p>
@@ -1410,7 +1397,7 @@
           <a:p>
             <a:fld id="{C48D9447-CBD6-49A1-89FD-8512A8CF8999}" type="datetime1">
               <a:rPr lang="en-US" smtClean="0"/>
-              <a:t>10/26/2015</a:t>
+              <a:t>10/25/2016</a:t>
             </a:fld>
             <a:endParaRPr lang="en-US"/>
           </a:p>
@@ -1504,10 +1491,9 @@
           <a:lstStyle/>
           <a:p>
             <a:r>
-              <a:rPr lang="en-US" smtClean="0"/>
+              <a:rPr lang="en-US"/>
               <a:t>Click to edit Master title style</a:t>
             </a:r>
-            <a:endParaRPr lang="en-US"/>
           </a:p>
         </p:txBody>
       </p:sp>
@@ -1528,38 +1514,37 @@
           <a:p>
             <a:pPr lvl="0"/>
             <a:r>
-              <a:rPr lang="en-US" smtClean="0"/>
+              <a:rPr lang="en-US"/>
               <a:t>Click to edit Master text styles</a:t>
             </a:r>
           </a:p>
           <a:p>
             <a:pPr lvl="1"/>
             <a:r>
-              <a:rPr lang="en-US" smtClean="0"/>
+              <a:rPr lang="en-US"/>
               <a:t>Second level</a:t>
             </a:r>
           </a:p>
           <a:p>
             <a:pPr lvl="2"/>
             <a:r>
-              <a:rPr lang="en-US" smtClean="0"/>
+              <a:rPr lang="en-US"/>
               <a:t>Third level</a:t>
             </a:r>
           </a:p>
           <a:p>
             <a:pPr lvl="3"/>
             <a:r>
-              <a:rPr lang="en-US" smtClean="0"/>
+              <a:rPr lang="en-US"/>
               <a:t>Fourth level</a:t>
             </a:r>
           </a:p>
           <a:p>
             <a:pPr lvl="4"/>
             <a:r>
-              <a:rPr lang="en-US" smtClean="0"/>
+              <a:rPr lang="en-US"/>
               <a:t>Fifth level</a:t>
             </a:r>
-            <a:endParaRPr lang="en-US"/>
           </a:p>
         </p:txBody>
       </p:sp>
@@ -1580,7 +1565,7 @@
           <a:p>
             <a:fld id="{A3639A2A-823D-48B7-9ACE-7FAF42870BA9}" type="datetime1">
               <a:rPr lang="en-US" smtClean="0"/>
-              <a:t>10/26/2015</a:t>
+              <a:t>10/25/2016</a:t>
             </a:fld>
             <a:endParaRPr lang="en-US"/>
           </a:p>
@@ -1679,10 +1664,9 @@
           <a:lstStyle/>
           <a:p>
             <a:r>
-              <a:rPr lang="en-US" smtClean="0"/>
+              <a:rPr lang="en-US"/>
               <a:t>Click to edit Master title style</a:t>
             </a:r>
-            <a:endParaRPr lang="en-US"/>
           </a:p>
         </p:txBody>
       </p:sp>
@@ -1708,38 +1692,37 @@
           <a:p>
             <a:pPr lvl="0"/>
             <a:r>
-              <a:rPr lang="en-US" smtClean="0"/>
+              <a:rPr lang="en-US"/>
               <a:t>Click to edit Master text styles</a:t>
             </a:r>
           </a:p>
           <a:p>
             <a:pPr lvl="1"/>
             <a:r>
-              <a:rPr lang="en-US" smtClean="0"/>
+              <a:rPr lang="en-US"/>
               <a:t>Second level</a:t>
             </a:r>
           </a:p>
           <a:p>
             <a:pPr lvl="2"/>
             <a:r>
-              <a:rPr lang="en-US" smtClean="0"/>
+              <a:rPr lang="en-US"/>
               <a:t>Third level</a:t>
             </a:r>
           </a:p>
           <a:p>
             <a:pPr lvl="3"/>
             <a:r>
-              <a:rPr lang="en-US" smtClean="0"/>
+              <a:rPr lang="en-US"/>
               <a:t>Fourth level</a:t>
             </a:r>
           </a:p>
           <a:p>
             <a:pPr lvl="4"/>
             <a:r>
-              <a:rPr lang="en-US" smtClean="0"/>
+              <a:rPr lang="en-US"/>
               <a:t>Fifth level</a:t>
             </a:r>
-            <a:endParaRPr lang="en-US"/>
           </a:p>
         </p:txBody>
       </p:sp>
@@ -1760,7 +1743,7 @@
           <a:p>
             <a:fld id="{ED1B6996-82E9-463C-972C-7B56056E426C}" type="datetime1">
               <a:rPr lang="en-US" smtClean="0"/>
-              <a:t>10/26/2015</a:t>
+              <a:t>10/25/2016</a:t>
             </a:fld>
             <a:endParaRPr lang="en-US"/>
           </a:p>
@@ -1860,10 +1843,9 @@
           <a:lstStyle/>
           <a:p>
             <a:r>
-              <a:rPr lang="en-US" dirty="0" smtClean="0"/>
+              <a:rPr lang="en-US" dirty="0"/>
               <a:t>Click to edit Master title style</a:t>
             </a:r>
-            <a:endParaRPr lang="en-US" dirty="0"/>
           </a:p>
         </p:txBody>
       </p:sp>
@@ -1884,38 +1866,37 @@
           <a:p>
             <a:pPr lvl="0"/>
             <a:r>
-              <a:rPr lang="en-US" smtClean="0"/>
+              <a:rPr lang="en-US"/>
               <a:t>Click to edit Master text styles</a:t>
             </a:r>
           </a:p>
           <a:p>
             <a:pPr lvl="1"/>
             <a:r>
-              <a:rPr lang="en-US" smtClean="0"/>
+              <a:rPr lang="en-US"/>
               <a:t>Second level</a:t>
             </a:r>
           </a:p>
           <a:p>
             <a:pPr lvl="2"/>
             <a:r>
-              <a:rPr lang="en-US" smtClean="0"/>
+              <a:rPr lang="en-US"/>
               <a:t>Third level</a:t>
             </a:r>
           </a:p>
           <a:p>
             <a:pPr lvl="3"/>
             <a:r>
-              <a:rPr lang="en-US" smtClean="0"/>
+              <a:rPr lang="en-US"/>
               <a:t>Fourth level</a:t>
             </a:r>
           </a:p>
           <a:p>
             <a:pPr lvl="4"/>
             <a:r>
-              <a:rPr lang="en-US" smtClean="0"/>
+              <a:rPr lang="en-US"/>
               <a:t>Fifth level</a:t>
             </a:r>
-            <a:endParaRPr lang="en-US"/>
           </a:p>
         </p:txBody>
       </p:sp>
@@ -1936,7 +1917,7 @@
           <a:p>
             <a:fld id="{E22ED4DA-448D-4BB1-B935-CC112220207B}" type="datetime1">
               <a:rPr lang="en-US" smtClean="0"/>
-              <a:t>10/26/2015</a:t>
+              <a:t>10/25/2016</a:t>
             </a:fld>
             <a:endParaRPr lang="en-US"/>
           </a:p>
@@ -1994,13 +1975,6 @@
   <p:clrMapOvr>
     <a:masterClrMapping/>
   </p:clrMapOvr>
-  <p:timing>
-    <p:tnLst>
-      <p:par>
-        <p:cTn id="1" dur="indefinite" restart="never" nodeType="tmRoot"/>
-      </p:par>
-    </p:tnLst>
-  </p:timing>
 </p:sldLayout>
 </file>
 
@@ -2037,10 +2011,9 @@
           <a:lstStyle/>
           <a:p>
             <a:r>
-              <a:rPr lang="en-US" smtClean="0"/>
+              <a:rPr lang="en-US"/>
               <a:t>Click to edit Master title style</a:t>
             </a:r>
-            <a:endParaRPr lang="en-US"/>
           </a:p>
         </p:txBody>
       </p:sp>
@@ -2066,38 +2039,37 @@
           <a:p>
             <a:pPr lvl="0"/>
             <a:r>
-              <a:rPr lang="en-US" dirty="0" smtClean="0"/>
+              <a:rPr lang="en-US" dirty="0"/>
               <a:t>Click to edit Master text styles</a:t>
             </a:r>
           </a:p>
           <a:p>
             <a:pPr lvl="1"/>
             <a:r>
-              <a:rPr lang="en-US" dirty="0" smtClean="0"/>
+              <a:rPr lang="en-US" dirty="0"/>
               <a:t>Second level</a:t>
             </a:r>
           </a:p>
           <a:p>
             <a:pPr lvl="2"/>
             <a:r>
-              <a:rPr lang="en-US" dirty="0" smtClean="0"/>
+              <a:rPr lang="en-US" dirty="0"/>
               <a:t>Third level</a:t>
             </a:r>
           </a:p>
           <a:p>
             <a:pPr lvl="3"/>
             <a:r>
-              <a:rPr lang="en-US" dirty="0" smtClean="0"/>
+              <a:rPr lang="en-US" dirty="0"/>
               <a:t>Fourth level</a:t>
             </a:r>
           </a:p>
           <a:p>
             <a:pPr lvl="4"/>
             <a:r>
-              <a:rPr lang="en-US" dirty="0" smtClean="0"/>
+              <a:rPr lang="en-US" dirty="0"/>
               <a:t>Fifth level</a:t>
             </a:r>
-            <a:endParaRPr lang="en-US" dirty="0"/>
           </a:p>
         </p:txBody>
       </p:sp>
@@ -2118,7 +2090,7 @@
           <a:p>
             <a:fld id="{E22ED4DA-448D-4BB1-B935-CC112220207B}" type="datetime1">
               <a:rPr lang="en-US" smtClean="0"/>
-              <a:t>10/26/2015</a:t>
+              <a:t>10/25/2016</a:t>
             </a:fld>
             <a:endParaRPr lang="en-US"/>
           </a:p>
@@ -2208,7 +2180,7 @@
           <a:lstStyle/>
           <a:p>
             <a:pPr algn="ctr"/>
-            <a:endParaRPr lang="en-US" dirty="0" smtClean="0">
+            <a:endParaRPr lang="en-US" dirty="0">
               <a:solidFill>
                 <a:schemeClr val="tx1"/>
               </a:solidFill>
@@ -2239,11 +2211,11 @@
           <a:lstStyle/>
           <a:p>
             <a:r>
-              <a:rPr lang="en-US" dirty="0" smtClean="0"/>
+              <a:rPr lang="en-US" dirty="0"/>
               <a:t>Resize video to this</a:t>
             </a:r>
             <a:r>
-              <a:rPr lang="en-US" baseline="0" dirty="0" smtClean="0"/>
+              <a:rPr lang="en-US" baseline="0" dirty="0"/>
               <a:t> box.</a:t>
             </a:r>
             <a:endParaRPr lang="en-US" dirty="0"/>
@@ -2260,13 +2232,6 @@
   <p:clrMapOvr>
     <a:masterClrMapping/>
   </p:clrMapOvr>
-  <p:timing>
-    <p:tnLst>
-      <p:par>
-        <p:cTn id="1" dur="indefinite" restart="never" nodeType="tmRoot"/>
-      </p:par>
-    </p:tnLst>
-  </p:timing>
 </p:sldLayout>
 </file>
 
@@ -2303,10 +2268,9 @@
           <a:lstStyle/>
           <a:p>
             <a:r>
-              <a:rPr lang="en-US" smtClean="0"/>
+              <a:rPr lang="en-US"/>
               <a:t>Click to edit Master title style</a:t>
             </a:r>
-            <a:endParaRPr lang="en-US"/>
           </a:p>
         </p:txBody>
       </p:sp>
@@ -2335,38 +2299,37 @@
           <a:p>
             <a:pPr lvl="0"/>
             <a:r>
-              <a:rPr lang="en-US" dirty="0" smtClean="0"/>
+              <a:rPr lang="en-US" dirty="0"/>
               <a:t>Click to edit Master text styles</a:t>
             </a:r>
           </a:p>
           <a:p>
             <a:pPr lvl="1"/>
             <a:r>
-              <a:rPr lang="en-US" dirty="0" smtClean="0"/>
+              <a:rPr lang="en-US" dirty="0"/>
               <a:t>Second level</a:t>
             </a:r>
           </a:p>
           <a:p>
             <a:pPr lvl="2"/>
             <a:r>
-              <a:rPr lang="en-US" dirty="0" smtClean="0"/>
+              <a:rPr lang="en-US" dirty="0"/>
               <a:t>Third level</a:t>
             </a:r>
           </a:p>
           <a:p>
             <a:pPr lvl="3"/>
             <a:r>
-              <a:rPr lang="en-US" dirty="0" smtClean="0"/>
+              <a:rPr lang="en-US" dirty="0"/>
               <a:t>Fourth level</a:t>
             </a:r>
           </a:p>
           <a:p>
             <a:pPr lvl="4"/>
             <a:r>
-              <a:rPr lang="en-US" dirty="0" smtClean="0"/>
+              <a:rPr lang="en-US" dirty="0"/>
               <a:t>Fifth level</a:t>
             </a:r>
-            <a:endParaRPr lang="en-US" dirty="0"/>
           </a:p>
         </p:txBody>
       </p:sp>
@@ -2387,7 +2350,7 @@
           <a:p>
             <a:fld id="{FF5D65A6-AB94-4435-B0B7-3743215FA46C}" type="datetime1">
               <a:rPr lang="en-US" smtClean="0"/>
-              <a:t>10/26/2015</a:t>
+              <a:t>10/25/2016</a:t>
             </a:fld>
             <a:endParaRPr lang="en-US"/>
           </a:p>
@@ -2445,13 +2408,6 @@
   <p:clrMapOvr>
     <a:masterClrMapping/>
   </p:clrMapOvr>
-  <p:timing>
-    <p:tnLst>
-      <p:par>
-        <p:cTn id="1" dur="indefinite" restart="never" nodeType="tmRoot"/>
-      </p:par>
-    </p:tnLst>
-  </p:timing>
 </p:sldLayout>
 </file>
 
@@ -2488,10 +2444,9 @@
           <a:lstStyle/>
           <a:p>
             <a:r>
-              <a:rPr lang="en-US" smtClean="0"/>
+              <a:rPr lang="en-US"/>
               <a:t>Click to edit Master title style</a:t>
             </a:r>
-            <a:endParaRPr lang="en-US"/>
           </a:p>
         </p:txBody>
       </p:sp>
@@ -2520,38 +2475,37 @@
           <a:p>
             <a:pPr lvl="0"/>
             <a:r>
-              <a:rPr lang="en-US" dirty="0" smtClean="0"/>
+              <a:rPr lang="en-US" dirty="0"/>
               <a:t>Click to edit Master text styles</a:t>
             </a:r>
           </a:p>
           <a:p>
             <a:pPr lvl="1"/>
             <a:r>
-              <a:rPr lang="en-US" dirty="0" smtClean="0"/>
+              <a:rPr lang="en-US" dirty="0"/>
               <a:t>Second level</a:t>
             </a:r>
           </a:p>
           <a:p>
             <a:pPr lvl="2"/>
             <a:r>
-              <a:rPr lang="en-US" dirty="0" smtClean="0"/>
+              <a:rPr lang="en-US" dirty="0"/>
               <a:t>Third level</a:t>
             </a:r>
           </a:p>
           <a:p>
             <a:pPr lvl="3"/>
             <a:r>
-              <a:rPr lang="en-US" dirty="0" smtClean="0"/>
+              <a:rPr lang="en-US" dirty="0"/>
               <a:t>Fourth level</a:t>
             </a:r>
           </a:p>
           <a:p>
             <a:pPr lvl="4"/>
             <a:r>
-              <a:rPr lang="en-US" dirty="0" smtClean="0"/>
+              <a:rPr lang="en-US" dirty="0"/>
               <a:t>Fifth level</a:t>
             </a:r>
-            <a:endParaRPr lang="en-US" dirty="0"/>
           </a:p>
         </p:txBody>
       </p:sp>
@@ -2572,7 +2526,7 @@
           <a:p>
             <a:fld id="{FF5D65A6-AB94-4435-B0B7-3743215FA46C}" type="datetime1">
               <a:rPr lang="en-US" smtClean="0"/>
-              <a:t>10/26/2015</a:t>
+              <a:t>10/25/2016</a:t>
             </a:fld>
             <a:endParaRPr lang="en-US"/>
           </a:p>
@@ -2679,13 +2633,6 @@
   <p:clrMapOvr>
     <a:masterClrMapping/>
   </p:clrMapOvr>
-  <p:timing>
-    <p:tnLst>
-      <p:par>
-        <p:cTn id="1" dur="indefinite" restart="never" nodeType="tmRoot"/>
-      </p:par>
-    </p:tnLst>
-  </p:timing>
 </p:sldLayout>
 </file>
 
@@ -2731,10 +2678,9 @@
           </a:lstStyle>
           <a:p>
             <a:r>
-              <a:rPr lang="en-US" smtClean="0"/>
+              <a:rPr lang="en-US"/>
               <a:t>Click to edit Master title style</a:t>
             </a:r>
-            <a:endParaRPr lang="en-US"/>
           </a:p>
         </p:txBody>
       </p:sp>
@@ -2851,7 +2797,7 @@
           <a:p>
             <a:pPr lvl="0"/>
             <a:r>
-              <a:rPr lang="en-US" smtClean="0"/>
+              <a:rPr lang="en-US"/>
               <a:t>Click to edit Master text styles</a:t>
             </a:r>
           </a:p>
@@ -2874,7 +2820,7 @@
           <a:p>
             <a:fld id="{7C193DC4-6EF0-48C9-B29C-616106A645E1}" type="datetime1">
               <a:rPr lang="en-US" smtClean="0"/>
-              <a:t>10/26/2015</a:t>
+              <a:t>10/25/2016</a:t>
             </a:fld>
             <a:endParaRPr lang="en-US"/>
           </a:p>
@@ -2968,10 +2914,9 @@
           <a:lstStyle/>
           <a:p>
             <a:r>
-              <a:rPr lang="en-US" smtClean="0"/>
+              <a:rPr lang="en-US"/>
               <a:t>Click to edit Master title style</a:t>
             </a:r>
-            <a:endParaRPr lang="en-US"/>
           </a:p>
         </p:txBody>
       </p:sp>
@@ -3025,38 +2970,37 @@
           <a:p>
             <a:pPr lvl="0"/>
             <a:r>
-              <a:rPr lang="en-US" smtClean="0"/>
+              <a:rPr lang="en-US"/>
               <a:t>Click to edit Master text styles</a:t>
             </a:r>
           </a:p>
           <a:p>
             <a:pPr lvl="1"/>
             <a:r>
-              <a:rPr lang="en-US" smtClean="0"/>
+              <a:rPr lang="en-US"/>
               <a:t>Second level</a:t>
             </a:r>
           </a:p>
           <a:p>
             <a:pPr lvl="2"/>
             <a:r>
-              <a:rPr lang="en-US" smtClean="0"/>
+              <a:rPr lang="en-US"/>
               <a:t>Third level</a:t>
             </a:r>
           </a:p>
           <a:p>
             <a:pPr lvl="3"/>
             <a:r>
-              <a:rPr lang="en-US" smtClean="0"/>
+              <a:rPr lang="en-US"/>
               <a:t>Fourth level</a:t>
             </a:r>
           </a:p>
           <a:p>
             <a:pPr lvl="4"/>
             <a:r>
-              <a:rPr lang="en-US" smtClean="0"/>
+              <a:rPr lang="en-US"/>
               <a:t>Fifth level</a:t>
             </a:r>
-            <a:endParaRPr lang="en-US"/>
           </a:p>
         </p:txBody>
       </p:sp>
@@ -3110,38 +3054,37 @@
           <a:p>
             <a:pPr lvl="0"/>
             <a:r>
-              <a:rPr lang="en-US" smtClean="0"/>
+              <a:rPr lang="en-US"/>
               <a:t>Click to edit Master text styles</a:t>
             </a:r>
           </a:p>
           <a:p>
             <a:pPr lvl="1"/>
             <a:r>
-              <a:rPr lang="en-US" smtClean="0"/>
+              <a:rPr lang="en-US"/>
               <a:t>Second level</a:t>
             </a:r>
           </a:p>
           <a:p>
             <a:pPr lvl="2"/>
             <a:r>
-              <a:rPr lang="en-US" smtClean="0"/>
+              <a:rPr lang="en-US"/>
               <a:t>Third level</a:t>
             </a:r>
           </a:p>
           <a:p>
             <a:pPr lvl="3"/>
             <a:r>
-              <a:rPr lang="en-US" smtClean="0"/>
+              <a:rPr lang="en-US"/>
               <a:t>Fourth level</a:t>
             </a:r>
           </a:p>
           <a:p>
             <a:pPr lvl="4"/>
             <a:r>
-              <a:rPr lang="en-US" smtClean="0"/>
+              <a:rPr lang="en-US"/>
               <a:t>Fifth level</a:t>
             </a:r>
-            <a:endParaRPr lang="en-US"/>
           </a:p>
         </p:txBody>
       </p:sp>
@@ -3162,7 +3105,7 @@
           <a:p>
             <a:fld id="{5D1846AD-9252-4647-9435-4C2AC365653A}" type="datetime1">
               <a:rPr lang="en-US" smtClean="0"/>
-              <a:t>10/26/2015</a:t>
+              <a:t>10/25/2016</a:t>
             </a:fld>
             <a:endParaRPr lang="en-US"/>
           </a:p>
@@ -3260,10 +3203,9 @@
           </a:lstStyle>
           <a:p>
             <a:r>
-              <a:rPr lang="en-US" smtClean="0"/>
+              <a:rPr lang="en-US"/>
               <a:t>Click to edit Master title style</a:t>
             </a:r>
-            <a:endParaRPr lang="en-US"/>
           </a:p>
         </p:txBody>
       </p:sp>
@@ -3326,7 +3268,7 @@
           <a:p>
             <a:pPr lvl="0"/>
             <a:r>
-              <a:rPr lang="en-US" smtClean="0"/>
+              <a:rPr lang="en-US"/>
               <a:t>Click to edit Master text styles</a:t>
             </a:r>
           </a:p>
@@ -3382,38 +3324,37 @@
           <a:p>
             <a:pPr lvl="0"/>
             <a:r>
-              <a:rPr lang="en-US" smtClean="0"/>
+              <a:rPr lang="en-US"/>
               <a:t>Click to edit Master text styles</a:t>
             </a:r>
           </a:p>
           <a:p>
             <a:pPr lvl="1"/>
             <a:r>
-              <a:rPr lang="en-US" smtClean="0"/>
+              <a:rPr lang="en-US"/>
               <a:t>Second level</a:t>
             </a:r>
           </a:p>
           <a:p>
             <a:pPr lvl="2"/>
             <a:r>
-              <a:rPr lang="en-US" smtClean="0"/>
+              <a:rPr lang="en-US"/>
               <a:t>Third level</a:t>
             </a:r>
           </a:p>
           <a:p>
             <a:pPr lvl="3"/>
             <a:r>
-              <a:rPr lang="en-US" smtClean="0"/>
+              <a:rPr lang="en-US"/>
               <a:t>Fourth level</a:t>
             </a:r>
           </a:p>
           <a:p>
             <a:pPr lvl="4"/>
             <a:r>
-              <a:rPr lang="en-US" smtClean="0"/>
+              <a:rPr lang="en-US"/>
               <a:t>Fifth level</a:t>
             </a:r>
-            <a:endParaRPr lang="en-US"/>
           </a:p>
         </p:txBody>
       </p:sp>
@@ -3476,7 +3417,7 @@
           <a:p>
             <a:pPr lvl="0"/>
             <a:r>
-              <a:rPr lang="en-US" smtClean="0"/>
+              <a:rPr lang="en-US"/>
               <a:t>Click to edit Master text styles</a:t>
             </a:r>
           </a:p>
@@ -3532,38 +3473,37 @@
           <a:p>
             <a:pPr lvl="0"/>
             <a:r>
-              <a:rPr lang="en-US" smtClean="0"/>
+              <a:rPr lang="en-US"/>
               <a:t>Click to edit Master text styles</a:t>
             </a:r>
           </a:p>
           <a:p>
             <a:pPr lvl="1"/>
             <a:r>
-              <a:rPr lang="en-US" smtClean="0"/>
+              <a:rPr lang="en-US"/>
               <a:t>Second level</a:t>
             </a:r>
           </a:p>
           <a:p>
             <a:pPr lvl="2"/>
             <a:r>
-              <a:rPr lang="en-US" smtClean="0"/>
+              <a:rPr lang="en-US"/>
               <a:t>Third level</a:t>
             </a:r>
           </a:p>
           <a:p>
             <a:pPr lvl="3"/>
             <a:r>
-              <a:rPr lang="en-US" smtClean="0"/>
+              <a:rPr lang="en-US"/>
               <a:t>Fourth level</a:t>
             </a:r>
           </a:p>
           <a:p>
             <a:pPr lvl="4"/>
             <a:r>
-              <a:rPr lang="en-US" smtClean="0"/>
+              <a:rPr lang="en-US"/>
               <a:t>Fifth level</a:t>
             </a:r>
-            <a:endParaRPr lang="en-US"/>
           </a:p>
         </p:txBody>
       </p:sp>
@@ -3584,7 +3524,7 @@
           <a:p>
             <a:fld id="{CE56DC10-3561-4063-A6AF-C1CC7A41040A}" type="datetime1">
               <a:rPr lang="en-US" smtClean="0"/>
-              <a:t>10/26/2015</a:t>
+              <a:t>10/25/2016</a:t>
             </a:fld>
             <a:endParaRPr lang="en-US"/>
           </a:p>
@@ -3678,10 +3618,9 @@
           <a:lstStyle/>
           <a:p>
             <a:r>
-              <a:rPr lang="en-US" smtClean="0"/>
+              <a:rPr lang="en-US"/>
               <a:t>Click to edit Master title style</a:t>
             </a:r>
-            <a:endParaRPr lang="en-US"/>
           </a:p>
         </p:txBody>
       </p:sp>
@@ -3702,7 +3641,7 @@
           <a:p>
             <a:fld id="{2F7B77F5-1464-4F6B-92A8-64FC8A508293}" type="datetime1">
               <a:rPr lang="en-US" smtClean="0"/>
-              <a:t>10/26/2015</a:t>
+              <a:t>10/25/2016</a:t>
             </a:fld>
             <a:endParaRPr lang="en-US"/>
           </a:p>
@@ -3760,13 +3699,6 @@
   <p:clrMapOvr>
     <a:masterClrMapping/>
   </p:clrMapOvr>
-  <p:timing>
-    <p:tnLst>
-      <p:par>
-        <p:cTn id="1" dur="indefinite" restart="never" nodeType="tmRoot"/>
-      </p:par>
-    </p:tnLst>
-  </p:timing>
 </p:sldLayout>
 </file>
 
@@ -3830,10 +3762,9 @@
           <a:lstStyle/>
           <a:p>
             <a:r>
-              <a:rPr lang="en-US" smtClean="0"/>
+              <a:rPr lang="en-US"/>
               <a:t>Click to edit Master title style</a:t>
             </a:r>
-            <a:endParaRPr lang="en-US"/>
           </a:p>
         </p:txBody>
       </p:sp>
@@ -3864,38 +3795,37 @@
           <a:p>
             <a:pPr lvl="0"/>
             <a:r>
-              <a:rPr lang="en-US" smtClean="0"/>
+              <a:rPr lang="en-US"/>
               <a:t>Click to edit Master text styles</a:t>
             </a:r>
           </a:p>
           <a:p>
             <a:pPr lvl="1"/>
             <a:r>
-              <a:rPr lang="en-US" smtClean="0"/>
+              <a:rPr lang="en-US"/>
               <a:t>Second level</a:t>
             </a:r>
           </a:p>
           <a:p>
             <a:pPr lvl="2"/>
             <a:r>
-              <a:rPr lang="en-US" smtClean="0"/>
+              <a:rPr lang="en-US"/>
               <a:t>Third level</a:t>
             </a:r>
           </a:p>
           <a:p>
             <a:pPr lvl="3"/>
             <a:r>
-              <a:rPr lang="en-US" smtClean="0"/>
+              <a:rPr lang="en-US"/>
               <a:t>Fourth level</a:t>
             </a:r>
           </a:p>
           <a:p>
             <a:pPr lvl="4"/>
             <a:r>
-              <a:rPr lang="en-US" smtClean="0"/>
+              <a:rPr lang="en-US"/>
               <a:t>Fifth level</a:t>
             </a:r>
-            <a:endParaRPr lang="en-US"/>
           </a:p>
         </p:txBody>
       </p:sp>
@@ -3934,7 +3864,7 @@
           <a:p>
             <a:fld id="{02B3F677-983B-48DB-ADFD-63FE6CBC7FB2}" type="datetime1">
               <a:rPr lang="en-US" smtClean="0"/>
-              <a:t>10/26/2015</a:t>
+              <a:t>10/25/2016</a:t>
             </a:fld>
             <a:endParaRPr lang="en-US"/>
           </a:p>
@@ -4042,13 +3972,6 @@
     <p:sldLayoutId id="2147483673" r:id="rId13"/>
     <p:sldLayoutId id="2147483674" r:id="rId14"/>
   </p:sldLayoutIdLst>
-  <p:timing>
-    <p:tnLst>
-      <p:par>
-        <p:cTn id="1" dur="indefinite" restart="never" nodeType="tmRoot"/>
-      </p:par>
-    </p:tnLst>
-  </p:timing>
   <p:hf hdr="0" ftr="0" dt="0"/>
   <p:txStyles>
     <p:titleStyle>
@@ -4336,41 +4259,40 @@
           <a:lstStyle/>
           <a:p>
             <a:r>
-              <a:rPr lang="en-US" dirty="0" smtClean="0"/>
+              <a:rPr lang="en-US" dirty="0"/>
               <a:t>More linear search with invariants</a:t>
             </a:r>
+          </a:p>
+        </p:txBody>
+      </p:sp>
+      <p:sp>
+        <p:nvSpPr>
+          <p:cNvPr id="3" name="Subtitle 2"/>
+          <p:cNvSpPr>
+            <a:spLocks noGrp="1"/>
+          </p:cNvSpPr>
+          <p:nvPr>
+            <p:ph type="subTitle" idx="1"/>
+          </p:nvPr>
+        </p:nvSpPr>
+        <p:spPr/>
+        <p:txBody>
+          <a:bodyPr/>
+          <a:lstStyle/>
+          <a:p>
+            <a:r>
+              <a:rPr lang="en-US" dirty="0"/>
+              <a:t>CS 5010 Program Design Paradigms “Bootcamp”</a:t>
+            </a:r>
+          </a:p>
+          <a:p>
+            <a:r>
+              <a:rPr lang="en-US" dirty="0"/>
+              <a:t>Lesson 8.6</a:t>
+            </a:r>
+          </a:p>
+          <a:p>
             <a:endParaRPr lang="en-US" dirty="0"/>
-          </a:p>
-        </p:txBody>
-      </p:sp>
-      <p:sp>
-        <p:nvSpPr>
-          <p:cNvPr id="3" name="Subtitle 2"/>
-          <p:cNvSpPr>
-            <a:spLocks noGrp="1"/>
-          </p:cNvSpPr>
-          <p:nvPr>
-            <p:ph type="subTitle" idx="1"/>
-          </p:nvPr>
-        </p:nvSpPr>
-        <p:spPr/>
-        <p:txBody>
-          <a:bodyPr/>
-          <a:lstStyle/>
-          <a:p>
-            <a:r>
-              <a:rPr lang="en-US" dirty="0" smtClean="0"/>
-              <a:t>CS 5010 Program Design Paradigms “Bootcamp”</a:t>
-            </a:r>
-          </a:p>
-          <a:p>
-            <a:r>
-              <a:rPr lang="en-US" dirty="0" smtClean="0"/>
-              <a:t>Lesson 8.6</a:t>
-            </a:r>
-          </a:p>
-          <a:p>
-            <a:endParaRPr lang="en-US" dirty="0" smtClean="0"/>
           </a:p>
           <a:p>
             <a:endParaRPr lang="en-US" dirty="0"/>
@@ -4428,29 +4350,29 @@
           <a:lstStyle/>
           <a:p>
             <a:r>
-              <a:rPr lang="en-US" smtClean="0"/>
+              <a:rPr lang="en-US"/>
               <a:t>TexPoint fonts used in EMF. </a:t>
             </a:r>
           </a:p>
           <a:p>
             <a:r>
-              <a:rPr lang="en-US" smtClean="0"/>
+              <a:rPr lang="en-US"/>
               <a:t>Read the TexPoint manual before you delete this box.: </a:t>
             </a:r>
             <a:r>
-              <a:rPr lang="en-US" smtClean="0">
+              <a:rPr lang="en-US">
                 <a:latin typeface="CMMI10"/>
               </a:rPr>
               <a:t>A</a:t>
             </a:r>
             <a:r>
-              <a:rPr lang="en-US" smtClean="0">
+              <a:rPr lang="en-US">
                 <a:latin typeface="CMR10"/>
               </a:rPr>
               <a:t>A</a:t>
             </a:r>
             <a:r>
-              <a:rPr lang="en-US" smtClean="0">
+              <a:rPr lang="en-US">
                 <a:latin typeface="CMSY10ORIG"/>
               </a:rPr>
               <a:t>A</a:t>
@@ -4527,27 +4449,13 @@
             <a:p>
               <a:r>
                 <a:rPr lang="en-US" sz="1000" dirty="0"/>
-                <a:t>© Mitchell Wand, </a:t>
-              </a:r>
-              <a:r>
-                <a:rPr lang="en-US" sz="1000" dirty="0" smtClean="0"/>
-                <a:t>2012-2014</a:t>
+                <a:t>© Mitchell Wand, 2012-2014</a:t>
               </a:r>
             </a:p>
             <a:p>
               <a:r>
-                <a:rPr lang="en-US" sz="1000" dirty="0" smtClean="0"/>
+                <a:rPr lang="en-US" sz="1000" dirty="0"/>
                 <a:t>This work is licensed under a </a:t>
-              </a:r>
-              <a:r>
-                <a:rPr lang="en-US" altLang="en-US" sz="1000" dirty="0" smtClean="0">
-                  <a:solidFill>
-                    <a:srgbClr val="4374B7"/>
-                  </a:solidFill>
-                  <a:latin typeface="Helvetica Neue"/>
-                  <a:hlinkClick r:id="rId5"/>
-                </a:rPr>
-                <a:t>Creative </a:t>
               </a:r>
               <a:r>
                 <a:rPr lang="en-US" altLang="en-US" sz="1000" dirty="0">
@@ -4557,7 +4465,7 @@
                   <a:latin typeface="Helvetica Neue"/>
                   <a:hlinkClick r:id="rId5"/>
                 </a:rPr>
-                <a:t>Commons Attribution-</a:t>
+                <a:t>Creative Commons Attribution-</a:t>
               </a:r>
               <a:r>
                 <a:rPr lang="en-US" altLang="en-US" sz="1000" dirty="0" err="1">
@@ -4580,10 +4488,9 @@
                 <a:t> 4.0 International License</a:t>
               </a:r>
               <a:r>
-                <a:rPr lang="en-US" sz="1000" dirty="0" smtClean="0"/>
+                <a:rPr lang="en-US" sz="1000" dirty="0"/>
                 <a:t>.</a:t>
               </a:r>
-              <a:endParaRPr lang="en-US" sz="1000" dirty="0"/>
             </a:p>
           </p:txBody>
         </p:sp>
@@ -4598,13 +4505,6 @@
   <p:clrMapOvr>
     <a:masterClrMapping/>
   </p:clrMapOvr>
-  <p:timing>
-    <p:tnLst>
-      <p:par>
-        <p:cTn id="1" dur="indefinite" restart="never" nodeType="tmRoot"/>
-      </p:par>
-    </p:tnLst>
-  </p:timing>
 </p:sld>
 </file>
 
@@ -4641,10 +4541,9 @@
           <a:lstStyle/>
           <a:p>
             <a:r>
-              <a:rPr lang="en-US" dirty="0" smtClean="0"/>
+              <a:rPr lang="en-US" dirty="0"/>
               <a:t>Function Definition</a:t>
             </a:r>
-            <a:endParaRPr lang="en-US" dirty="0"/>
           </a:p>
         </p:txBody>
       </p:sp>
@@ -4666,51 +4565,43 @@
           <a:lstStyle/>
           <a:p>
             <a:r>
-              <a:rPr lang="en-US" dirty="0" smtClean="0"/>
+              <a:rPr lang="en-US" dirty="0"/>
               <a:t>(define (int-sqrt.v2 n)</a:t>
             </a:r>
           </a:p>
           <a:p>
             <a:r>
-              <a:rPr lang="en-US" dirty="0" smtClean="0"/>
+              <a:rPr lang="en-US" dirty="0"/>
               <a:t>  (local</a:t>
             </a:r>
           </a:p>
           <a:p>
             <a:r>
-              <a:rPr lang="en-US" dirty="0" smtClean="0"/>
-              <a:t>    ((define </a:t>
-            </a:r>
-            <a:r>
-              <a:rPr lang="en-US" dirty="0" smtClean="0"/>
-              <a:t>(inner-loop </a:t>
-            </a:r>
-            <a:r>
-              <a:rPr lang="en-US" dirty="0" smtClean="0"/>
-              <a:t>z u)</a:t>
-            </a:r>
-          </a:p>
-          <a:p>
-            <a:r>
-              <a:rPr lang="en-US" dirty="0" smtClean="0"/>
+              <a:rPr lang="en-US" dirty="0"/>
+              <a:t>    ((define (inner-loop z u)</a:t>
+            </a:r>
+          </a:p>
+          <a:p>
+            <a:r>
+              <a:rPr lang="en-US" dirty="0"/>
               <a:t>       ;; PURPOSE: Returns </a:t>
             </a:r>
             <a:r>
-              <a:rPr lang="en-US" dirty="0" err="1" smtClean="0"/>
+              <a:rPr lang="en-US" dirty="0" err="1"/>
               <a:t>int-sqrt</a:t>
             </a:r>
             <a:r>
-              <a:rPr lang="en-US" dirty="0" smtClean="0"/>
+              <a:rPr lang="en-US" dirty="0"/>
               <a:t>(n)</a:t>
             </a:r>
           </a:p>
           <a:p>
             <a:r>
-              <a:rPr lang="en-US" dirty="0" smtClean="0"/>
+              <a:rPr lang="en-US" dirty="0"/>
               <a:t>       </a:t>
             </a:r>
             <a:r>
-              <a:rPr lang="en-US" dirty="0" smtClean="0">
+              <a:rPr lang="en-US" dirty="0">
                 <a:solidFill>
                   <a:srgbClr val="FF0000"/>
                 </a:solidFill>
@@ -4720,7 +4611,7 @@
           </a:p>
           <a:p>
             <a:r>
-              <a:rPr lang="en-US" dirty="0" smtClean="0">
+              <a:rPr lang="en-US" dirty="0">
                 <a:solidFill>
                   <a:srgbClr val="FF0000"/>
                 </a:solidFill>
@@ -4728,7 +4619,7 @@
               <a:t>       ;; AND u = (z+1)²</a:t>
             </a:r>
             <a:r>
-              <a:rPr lang="en-US" dirty="0" smtClean="0"/>
+              <a:rPr lang="en-US" dirty="0"/>
               <a:t>       </a:t>
             </a:r>
           </a:p>
@@ -4739,71 +4630,49 @@
                   <a:srgbClr val="00B050"/>
                 </a:solidFill>
               </a:rPr>
-              <a:t> </a:t>
-            </a:r>
-            <a:r>
-              <a:rPr lang="en-US" dirty="0" smtClean="0">
-                <a:solidFill>
-                  <a:srgbClr val="00B050"/>
-                </a:solidFill>
-              </a:rPr>
-              <a:t>      ;; HALTING MEASURE (- n z)</a:t>
-            </a:r>
-          </a:p>
-          <a:p>
-            <a:r>
-              <a:rPr lang="en-US" dirty="0" smtClean="0"/>
+              <a:t>       ;; HALTING MEASURE (- n z)</a:t>
+            </a:r>
+          </a:p>
+          <a:p>
+            <a:r>
+              <a:rPr lang="en-US" dirty="0"/>
               <a:t>       (</a:t>
             </a:r>
             <a:r>
-              <a:rPr lang="en-US" dirty="0" err="1" smtClean="0"/>
+              <a:rPr lang="en-US" dirty="0" err="1"/>
               <a:t>cond</a:t>
             </a:r>
-            <a:endParaRPr lang="en-US" dirty="0" smtClean="0"/>
-          </a:p>
-          <a:p>
-            <a:r>
-              <a:rPr lang="en-US" dirty="0" smtClean="0"/>
+            <a:endParaRPr lang="en-US" dirty="0"/>
+          </a:p>
+          <a:p>
+            <a:r>
+              <a:rPr lang="en-US" dirty="0"/>
               <a:t>         [(&lt; n u) z]</a:t>
             </a:r>
           </a:p>
           <a:p>
             <a:r>
-              <a:rPr lang="en-US" dirty="0" smtClean="0"/>
-              <a:t>         [else </a:t>
-            </a:r>
-            <a:r>
-              <a:rPr lang="en-US" dirty="0" smtClean="0"/>
-              <a:t>(inner-loop </a:t>
-            </a:r>
-            <a:endParaRPr lang="en-US" dirty="0" smtClean="0"/>
-          </a:p>
-          <a:p>
-            <a:r>
-              <a:rPr lang="en-US" dirty="0" smtClean="0"/>
+              <a:rPr lang="en-US" dirty="0"/>
+              <a:t>         [else (inner-loop </a:t>
+            </a:r>
+          </a:p>
+          <a:p>
+            <a:r>
+              <a:rPr lang="en-US" dirty="0"/>
               <a:t>                (+ 1 z)</a:t>
             </a:r>
           </a:p>
           <a:p>
             <a:r>
-              <a:rPr lang="en-US" dirty="0" smtClean="0"/>
+              <a:rPr lang="en-US" dirty="0"/>
               <a:t>                (+ u (* 2 z) 3))])))      </a:t>
             </a:r>
           </a:p>
           <a:p>
             <a:r>
-              <a:rPr lang="en-US" dirty="0" smtClean="0"/>
-              <a:t>    </a:t>
-            </a:r>
-            <a:r>
-              <a:rPr lang="en-US" dirty="0" smtClean="0"/>
-              <a:t>(inner-loop </a:t>
-            </a:r>
-            <a:r>
-              <a:rPr lang="en-US" dirty="0" smtClean="0"/>
-              <a:t>0 1))) </a:t>
-            </a:r>
-            <a:endParaRPr lang="en-US" dirty="0"/>
+              <a:rPr lang="en-US" dirty="0"/>
+              <a:t>    (inner-loop 0 1))) </a:t>
+            </a:r>
           </a:p>
         </p:txBody>
       </p:sp>
@@ -4844,6 +4713,9 @@
             <a:chOff x="3359649" y="1295400"/>
             <a:chExt cx="5631951" cy="1345058"/>
           </a:xfrm>
+          <a:solidFill>
+            <a:schemeClr val="bg1"/>
+          </a:solidFill>
         </p:grpSpPr>
         <p:sp>
           <p:nvSpPr>
@@ -4859,6 +4731,15 @@
             <a:prstGeom prst="rect">
               <a:avLst/>
             </a:prstGeom>
+            <a:solidFill>
+              <a:schemeClr val="accent1">
+                <a:lumMod val="20000"/>
+                <a:lumOff val="80000"/>
+              </a:schemeClr>
+            </a:solidFill>
+            <a:ln>
+              <a:noFill/>
+            </a:ln>
           </p:spPr>
           <p:style>
             <a:lnRef idx="1">
@@ -4881,16 +4762,8 @@
             <a:lstStyle/>
             <a:p>
               <a:r>
-                <a:rPr lang="en-US" sz="2400" dirty="0" smtClean="0"/>
-                <a:t>the </a:t>
-              </a:r>
-              <a:r>
-                <a:rPr lang="en-US" sz="2400" dirty="0" smtClean="0"/>
-                <a:t>inner loop </a:t>
-              </a:r>
-              <a:r>
-                <a:rPr lang="en-US" sz="2400" dirty="0" smtClean="0"/>
-                <a:t>finds the answer for the whole function</a:t>
+                <a:rPr lang="en-US" sz="2400" dirty="0"/>
+                <a:t>the inner loop finds the answer for the whole function</a:t>
               </a:r>
             </a:p>
           </p:txBody>
@@ -4947,6 +4820,7 @@
                 </a:path>
               </a:pathLst>
             </a:custGeom>
+            <a:grpFill/>
             <a:ln w="12700">
               <a:solidFill>
                 <a:schemeClr val="tx1"/>
@@ -4991,6 +4865,9 @@
             <a:chOff x="4489807" y="4191000"/>
             <a:chExt cx="4501793" cy="1017998"/>
           </a:xfrm>
+          <a:solidFill>
+            <a:schemeClr val="bg1"/>
+          </a:solidFill>
         </p:grpSpPr>
         <p:sp>
           <p:nvSpPr>
@@ -5006,6 +4883,12 @@
             <a:prstGeom prst="rect">
               <a:avLst/>
             </a:prstGeom>
+            <a:solidFill>
+              <a:schemeClr val="accent1">
+                <a:lumMod val="20000"/>
+                <a:lumOff val="80000"/>
+              </a:schemeClr>
+            </a:solidFill>
           </p:spPr>
           <p:style>
             <a:lnRef idx="1">
@@ -5028,7 +4911,7 @@
             <a:lstStyle/>
             <a:p>
               <a:r>
-                <a:rPr lang="en-US" sz="2400" dirty="0" smtClean="0"/>
+                <a:rPr lang="en-US" sz="2400" dirty="0"/>
                 <a:t>update context argument to maintain the invariant</a:t>
               </a:r>
             </a:p>
@@ -5086,6 +4969,7 @@
                 </a:path>
               </a:pathLst>
             </a:custGeom>
+            <a:grpFill/>
             <a:ln w="12700">
               <a:solidFill>
                 <a:schemeClr val="tx1"/>
@@ -5130,6 +5014,12 @@
             <a:chOff x="3010328" y="5562600"/>
             <a:chExt cx="5447872" cy="1200329"/>
           </a:xfrm>
+          <a:solidFill>
+            <a:schemeClr val="accent1">
+              <a:lumMod val="20000"/>
+              <a:lumOff val="80000"/>
+            </a:schemeClr>
+          </a:solidFill>
         </p:grpSpPr>
         <p:sp>
           <p:nvSpPr>
@@ -5145,6 +5035,7 @@
             <a:prstGeom prst="rect">
               <a:avLst/>
             </a:prstGeom>
+            <a:grpFill/>
           </p:spPr>
           <p:style>
             <a:lnRef idx="1">
@@ -5167,7 +5058,7 @@
             <a:lstStyle/>
             <a:p>
               <a:r>
-                <a:rPr lang="en-US" sz="2400" dirty="0" smtClean="0"/>
+                <a:rPr lang="en-US" sz="2400" dirty="0"/>
                 <a:t>initialize context argument to make the invariant true</a:t>
               </a:r>
             </a:p>
@@ -5225,6 +5116,7 @@
                 </a:path>
               </a:pathLst>
             </a:custGeom>
+            <a:noFill/>
             <a:ln w="12700">
               <a:solidFill>
                 <a:schemeClr val="tx1"/>
@@ -5269,6 +5161,9 @@
             <a:chOff x="3071973" y="3116494"/>
             <a:chExt cx="4155095" cy="1260297"/>
           </a:xfrm>
+          <a:solidFill>
+            <a:schemeClr val="bg1"/>
+          </a:solidFill>
         </p:grpSpPr>
         <p:sp>
           <p:nvSpPr>
@@ -5284,6 +5179,15 @@
             <a:prstGeom prst="rect">
               <a:avLst/>
             </a:prstGeom>
+            <a:solidFill>
+              <a:schemeClr val="accent1">
+                <a:lumMod val="20000"/>
+                <a:lumOff val="80000"/>
+              </a:schemeClr>
+            </a:solidFill>
+            <a:ln>
+              <a:noFill/>
+            </a:ln>
           </p:spPr>
           <p:style>
             <a:lnRef idx="1">
@@ -5306,7 +5210,7 @@
             <a:lstStyle/>
             <a:p>
               <a:r>
-                <a:rPr lang="en-US" sz="2400" dirty="0" smtClean="0"/>
+                <a:rPr lang="en-US" sz="2400" dirty="0"/>
                 <a:t>u = (z+1)²</a:t>
               </a:r>
             </a:p>
@@ -5364,6 +5268,7 @@
                 </a:path>
               </a:pathLst>
             </a:custGeom>
+            <a:grpFill/>
             <a:ln w="12700">
               <a:solidFill>
                 <a:schemeClr val="tx1"/>
@@ -5651,10 +5556,9 @@
           <a:lstStyle/>
           <a:p>
             <a:r>
-              <a:rPr lang="en-US" dirty="0" smtClean="0"/>
+              <a:rPr lang="en-US" dirty="0"/>
               <a:t>Let's do it one more time</a:t>
             </a:r>
-            <a:endParaRPr lang="en-US" dirty="0"/>
           </a:p>
         </p:txBody>
       </p:sp>
@@ -5676,46 +5580,46 @@
           <a:lstStyle/>
           <a:p>
             <a:r>
-              <a:rPr lang="en-US" dirty="0" smtClean="0"/>
+              <a:rPr lang="en-US" dirty="0"/>
               <a:t>Add invariant: v = 2*z+3</a:t>
             </a:r>
           </a:p>
           <a:p>
-            <a:endParaRPr lang="en-US" dirty="0" smtClean="0"/>
-          </a:p>
-          <a:p>
-            <a:r>
-              <a:rPr lang="en-US" dirty="0" smtClean="0"/>
+            <a:endParaRPr lang="en-US" dirty="0"/>
+          </a:p>
+          <a:p>
+            <a:r>
+              <a:rPr lang="en-US" dirty="0"/>
               <a:t>z' = z+1</a:t>
             </a:r>
           </a:p>
           <a:p>
             <a:r>
-              <a:rPr lang="en-US" dirty="0" smtClean="0"/>
+              <a:rPr lang="en-US" dirty="0"/>
               <a:t>v' = 2*z'+ 3</a:t>
             </a:r>
           </a:p>
           <a:p>
             <a:r>
-              <a:rPr lang="en-US" dirty="0" smtClean="0"/>
+              <a:rPr lang="en-US" dirty="0"/>
               <a:t>   = 2*(z+1) + 3</a:t>
             </a:r>
           </a:p>
           <a:p>
             <a:r>
-              <a:rPr lang="en-US" dirty="0" smtClean="0"/>
+              <a:rPr lang="en-US" dirty="0"/>
               <a:t>   = 2*z + 2 + 3</a:t>
             </a:r>
           </a:p>
           <a:p>
             <a:r>
-              <a:rPr lang="en-US" dirty="0" smtClean="0"/>
+              <a:rPr lang="en-US" dirty="0"/>
               <a:t>   = (2*z + 3) + 2 </a:t>
             </a:r>
           </a:p>
           <a:p>
             <a:r>
-              <a:rPr lang="en-US" dirty="0" smtClean="0"/>
+              <a:rPr lang="en-US" dirty="0"/>
               <a:t>   = v + 2</a:t>
             </a:r>
           </a:p>
@@ -5755,13 +5659,6 @@
   <p:clrMapOvr>
     <a:masterClrMapping/>
   </p:clrMapOvr>
-  <p:timing>
-    <p:tnLst>
-      <p:par>
-        <p:cTn id="1" dur="indefinite" restart="never" nodeType="tmRoot"/>
-      </p:par>
-    </p:tnLst>
-  </p:timing>
 </p:sld>
 </file>
 
@@ -5798,10 +5695,9 @@
           <a:lstStyle/>
           <a:p>
             <a:r>
-              <a:rPr lang="en-US" dirty="0" smtClean="0"/>
+              <a:rPr lang="en-US" dirty="0"/>
               <a:t>Function Definition</a:t>
             </a:r>
-            <a:endParaRPr lang="en-US" dirty="0"/>
           </a:p>
         </p:txBody>
       </p:sp>
@@ -5823,51 +5719,43 @@
           <a:lstStyle/>
           <a:p>
             <a:r>
-              <a:rPr lang="en-US" dirty="0" smtClean="0"/>
+              <a:rPr lang="en-US" dirty="0"/>
               <a:t>(define (int-sqrt.v3 n)</a:t>
             </a:r>
           </a:p>
           <a:p>
             <a:r>
-              <a:rPr lang="en-US" dirty="0" smtClean="0"/>
+              <a:rPr lang="en-US" dirty="0"/>
               <a:t>  (local</a:t>
             </a:r>
           </a:p>
           <a:p>
             <a:r>
-              <a:rPr lang="en-US" dirty="0" smtClean="0"/>
-              <a:t>    ((define </a:t>
-            </a:r>
-            <a:r>
-              <a:rPr lang="en-US" dirty="0" smtClean="0"/>
-              <a:t>(inner-loop </a:t>
-            </a:r>
-            <a:r>
-              <a:rPr lang="en-US" dirty="0" smtClean="0"/>
-              <a:t>z u v)</a:t>
-            </a:r>
-          </a:p>
-          <a:p>
-            <a:r>
-              <a:rPr lang="en-US" dirty="0" smtClean="0"/>
+              <a:rPr lang="en-US" dirty="0"/>
+              <a:t>    ((define (inner-loop z u v)</a:t>
+            </a:r>
+          </a:p>
+          <a:p>
+            <a:r>
+              <a:rPr lang="en-US" dirty="0"/>
               <a:t>      ;; PURPOSE: Returns </a:t>
             </a:r>
             <a:r>
-              <a:rPr lang="en-US" dirty="0" err="1" smtClean="0"/>
+              <a:rPr lang="en-US" dirty="0" err="1"/>
               <a:t>int-sqrt</a:t>
             </a:r>
             <a:r>
-              <a:rPr lang="en-US" dirty="0" smtClean="0"/>
+              <a:rPr lang="en-US" dirty="0"/>
               <a:t>(n)</a:t>
             </a:r>
           </a:p>
           <a:p>
             <a:r>
-              <a:rPr lang="en-US" dirty="0" smtClean="0"/>
+              <a:rPr lang="en-US" dirty="0"/>
               <a:t>       </a:t>
             </a:r>
             <a:r>
-              <a:rPr lang="en-US" dirty="0" smtClean="0">
+              <a:rPr lang="en-US" dirty="0">
                 <a:solidFill>
                   <a:srgbClr val="FF0000"/>
                 </a:solidFill>
@@ -5877,7 +5765,7 @@
           </a:p>
           <a:p>
             <a:r>
-              <a:rPr lang="en-US" dirty="0" smtClean="0">
+              <a:rPr lang="en-US" dirty="0">
                 <a:solidFill>
                   <a:srgbClr val="FF0000"/>
                 </a:solidFill>
@@ -5887,7 +5775,7 @@
           </a:p>
           <a:p>
             <a:r>
-              <a:rPr lang="en-US" dirty="0" smtClean="0">
+              <a:rPr lang="en-US" dirty="0">
                 <a:solidFill>
                   <a:srgbClr val="FF0000"/>
                 </a:solidFill>
@@ -5897,11 +5785,11 @@
           </a:p>
           <a:p>
             <a:r>
-              <a:rPr lang="en-US" dirty="0" smtClean="0"/>
+              <a:rPr lang="en-US" dirty="0"/>
               <a:t>       </a:t>
             </a:r>
             <a:r>
-              <a:rPr lang="en-US" dirty="0" smtClean="0">
+              <a:rPr lang="en-US" dirty="0">
                 <a:solidFill>
                   <a:srgbClr val="00B050"/>
                 </a:solidFill>
@@ -5911,64 +5799,50 @@
           </a:p>
           <a:p>
             <a:r>
-              <a:rPr lang="en-US" dirty="0" smtClean="0"/>
+              <a:rPr lang="en-US" dirty="0"/>
               <a:t>       (</a:t>
             </a:r>
             <a:r>
-              <a:rPr lang="en-US" dirty="0" err="1" smtClean="0"/>
+              <a:rPr lang="en-US" dirty="0" err="1"/>
               <a:t>cond</a:t>
             </a:r>
-            <a:endParaRPr lang="en-US" dirty="0" smtClean="0"/>
-          </a:p>
-          <a:p>
-            <a:r>
-              <a:rPr lang="en-US" dirty="0" smtClean="0"/>
+            <a:endParaRPr lang="en-US" dirty="0"/>
+          </a:p>
+          <a:p>
+            <a:r>
+              <a:rPr lang="en-US" dirty="0"/>
               <a:t>         [(&lt; n u) z]</a:t>
             </a:r>
           </a:p>
           <a:p>
             <a:r>
-              <a:rPr lang="en-US" dirty="0" smtClean="0"/>
-              <a:t>         [else </a:t>
-            </a:r>
-            <a:r>
-              <a:rPr lang="en-US" dirty="0" smtClean="0"/>
-              <a:t>(inner-loop </a:t>
-            </a:r>
-            <a:endParaRPr lang="en-US" dirty="0" smtClean="0"/>
-          </a:p>
-          <a:p>
-            <a:r>
-              <a:rPr lang="en-US" dirty="0" smtClean="0"/>
+              <a:rPr lang="en-US" dirty="0"/>
+              <a:t>         [else (inner-loop </a:t>
+            </a:r>
+          </a:p>
+          <a:p>
+            <a:r>
+              <a:rPr lang="en-US" dirty="0"/>
               <a:t>                (+ 1 z)</a:t>
             </a:r>
           </a:p>
           <a:p>
             <a:r>
-              <a:rPr lang="en-US" dirty="0" smtClean="0"/>
+              <a:rPr lang="en-US" dirty="0"/>
               <a:t>                (+ u v)</a:t>
             </a:r>
           </a:p>
           <a:p>
             <a:r>
-              <a:rPr lang="en-US" dirty="0" smtClean="0"/>
+              <a:rPr lang="en-US" dirty="0"/>
               <a:t>                (+ v 2))])))</a:t>
             </a:r>
           </a:p>
           <a:p>
             <a:r>
-              <a:rPr lang="en-US" dirty="0" smtClean="0"/>
-              <a:t>    </a:t>
-            </a:r>
-            <a:r>
-              <a:rPr lang="en-US" dirty="0" smtClean="0"/>
-              <a:t>(inner-loop </a:t>
-            </a:r>
-            <a:r>
-              <a:rPr lang="en-US" dirty="0" smtClean="0"/>
-              <a:t>0 1 3)))</a:t>
-            </a:r>
-            <a:endParaRPr lang="en-US" dirty="0"/>
+              <a:rPr lang="en-US" dirty="0"/>
+              <a:t>    (inner-loop 0 1 3)))</a:t>
+            </a:r>
           </a:p>
         </p:txBody>
       </p:sp>
@@ -6024,6 +5898,12 @@
             <a:prstGeom prst="rect">
               <a:avLst/>
             </a:prstGeom>
+            <a:solidFill>
+              <a:schemeClr val="accent1">
+                <a:lumMod val="20000"/>
+                <a:lumOff val="80000"/>
+              </a:schemeClr>
+            </a:solidFill>
           </p:spPr>
           <p:style>
             <a:lnRef idx="1">
@@ -6046,7 +5926,7 @@
             <a:lstStyle/>
             <a:p>
               <a:r>
-                <a:rPr lang="en-US" sz="2400" dirty="0" smtClean="0"/>
+                <a:rPr lang="en-US" sz="2400" dirty="0"/>
                 <a:t>v = 2z+3</a:t>
               </a:r>
             </a:p>
@@ -6163,6 +6043,12 @@
             <a:prstGeom prst="rect">
               <a:avLst/>
             </a:prstGeom>
+            <a:solidFill>
+              <a:schemeClr val="accent1">
+                <a:lumMod val="20000"/>
+                <a:lumOff val="80000"/>
+              </a:schemeClr>
+            </a:solidFill>
           </p:spPr>
           <p:style>
             <a:lnRef idx="1">
@@ -6185,7 +6071,7 @@
             <a:lstStyle/>
             <a:p>
               <a:r>
-                <a:rPr lang="en-US" sz="2400" dirty="0" smtClean="0"/>
+                <a:rPr lang="en-US" sz="2400" dirty="0"/>
                 <a:t>u = (z+1)²</a:t>
               </a:r>
             </a:p>
@@ -6307,12 +6193,14 @@
             <a:avLst/>
           </a:prstGeom>
           <a:solidFill>
-            <a:schemeClr val="accent3">
-              <a:lumMod val="40000"/>
-              <a:lumOff val="60000"/>
+            <a:schemeClr val="accent1">
+              <a:lumMod val="20000"/>
+              <a:lumOff val="80000"/>
             </a:schemeClr>
           </a:solidFill>
-          <a:ln/>
+          <a:ln>
+            <a:noFill/>
+          </a:ln>
         </p:spPr>
         <p:style>
           <a:lnRef idx="2">
@@ -6339,12 +6227,12 @@
           <a:p>
             <a:pPr algn="ctr"/>
             <a:r>
-              <a:rPr lang="en-US" dirty="0" smtClean="0">
+              <a:rPr lang="en-US" dirty="0">
                 <a:solidFill>
                   <a:schemeClr val="tx1"/>
                 </a:solidFill>
               </a:rPr>
-              <a:t>You could never understand this program if I hadn't written down the invariants!</a:t>
+              <a:t>You could never have understood this program if I hadn't written down the invariants!</a:t>
             </a:r>
           </a:p>
         </p:txBody>
@@ -6571,10 +6459,9 @@
           <a:lstStyle/>
           <a:p>
             <a:r>
-              <a:rPr lang="en-US" dirty="0" smtClean="0"/>
+              <a:rPr lang="en-US" dirty="0"/>
               <a:t>Lesson Summary</a:t>
             </a:r>
-            <a:endParaRPr lang="en-US" dirty="0"/>
           </a:p>
         </p:txBody>
       </p:sp>
@@ -6594,22 +6481,21 @@
           <a:lstStyle/>
           <a:p>
             <a:r>
-              <a:rPr lang="en-US" dirty="0" smtClean="0"/>
+              <a:rPr lang="en-US" dirty="0"/>
               <a:t>We’ve seen how invariants can be used to improve the code of a linear search or loop.</a:t>
             </a:r>
           </a:p>
           <a:p>
             <a:r>
-              <a:rPr lang="en-US" dirty="0" smtClean="0"/>
+              <a:rPr lang="en-US" dirty="0"/>
               <a:t>We’ve seen how invariants can be used to explain the “reduction-in-strength” optimization.</a:t>
             </a:r>
           </a:p>
           <a:p>
             <a:r>
-              <a:rPr lang="en-US" dirty="0" smtClean="0"/>
+              <a:rPr lang="en-US" dirty="0"/>
               <a:t>We’ve seen how invariants can be used to explain an otherwise-obscure piece of code. </a:t>
             </a:r>
-            <a:endParaRPr lang="en-US" dirty="0"/>
           </a:p>
         </p:txBody>
       </p:sp>
@@ -6646,13 +6532,6 @@
   <p:clrMapOvr>
     <a:masterClrMapping/>
   </p:clrMapOvr>
-  <p:timing>
-    <p:tnLst>
-      <p:par>
-        <p:cTn id="1" dur="indefinite" restart="never" nodeType="tmRoot"/>
-      </p:par>
-    </p:tnLst>
-  </p:timing>
 </p:sld>
 </file>
 
@@ -6689,10 +6568,9 @@
           <a:lstStyle/>
           <a:p>
             <a:r>
-              <a:rPr lang="en-US" dirty="0" smtClean="0"/>
+              <a:rPr lang="en-US" dirty="0"/>
               <a:t>Next Steps</a:t>
             </a:r>
-            <a:endParaRPr lang="en-US" dirty="0"/>
           </a:p>
         </p:txBody>
       </p:sp>
@@ -6712,40 +6590,21 @@
           <a:lstStyle/>
           <a:p>
             <a:r>
-              <a:rPr lang="en-US" dirty="0" smtClean="0"/>
-              <a:t>Study </a:t>
-            </a:r>
-            <a:r>
-              <a:rPr lang="en-US" smtClean="0"/>
-              <a:t>the file 08-8-square-roots.rkt </a:t>
-            </a:r>
-            <a:r>
-              <a:rPr lang="en-US" dirty="0" smtClean="0"/>
-              <a:t>in the Examples folder.</a:t>
-            </a:r>
-          </a:p>
-          <a:p>
-            <a:r>
               <a:rPr lang="en-US" dirty="0"/>
-              <a:t>Do the Guided </a:t>
-            </a:r>
-            <a:r>
-              <a:rPr lang="en-US" dirty="0" smtClean="0"/>
-              <a:t>Practices</a:t>
-            </a:r>
-          </a:p>
-          <a:p>
-            <a:r>
-              <a:rPr lang="en-US" dirty="0" smtClean="0"/>
+              <a:t>Study the file 08-8-square-roots.rkt in the Examples folder.</a:t>
+            </a:r>
+          </a:p>
+          <a:p>
+            <a:r>
+              <a:rPr lang="en-US" dirty="0"/>
               <a:t>If you have questions about this lesson, ask them on the Discussion Board</a:t>
             </a:r>
           </a:p>
           <a:p>
             <a:r>
-              <a:rPr lang="en-US" dirty="0" smtClean="0"/>
+              <a:rPr lang="en-US" dirty="0"/>
               <a:t>Go on to the next lesson</a:t>
             </a:r>
-            <a:endParaRPr lang="en-US" dirty="0"/>
           </a:p>
         </p:txBody>
       </p:sp>
@@ -6782,13 +6641,6 @@
   <p:clrMapOvr>
     <a:masterClrMapping/>
   </p:clrMapOvr>
-  <p:timing>
-    <p:tnLst>
-      <p:par>
-        <p:cTn id="1" dur="indefinite" restart="never" nodeType="tmRoot"/>
-      </p:par>
-    </p:tnLst>
-  </p:timing>
 </p:sld>
 </file>
 
@@ -6825,10 +6677,9 @@
           <a:lstStyle/>
           <a:p>
             <a:r>
-              <a:rPr lang="en-US" dirty="0" smtClean="0"/>
+              <a:rPr lang="en-US" dirty="0"/>
               <a:t>Lesson Introduction</a:t>
             </a:r>
-            <a:endParaRPr lang="en-US" dirty="0"/>
           </a:p>
         </p:txBody>
       </p:sp>
@@ -6848,16 +6699,15 @@
           <a:lstStyle/>
           <a:p>
             <a:r>
-              <a:rPr lang="en-US" dirty="0" smtClean="0"/>
+              <a:rPr lang="en-US" dirty="0"/>
               <a:t>In this lesson, we’ll show an example of how invariants can be used to improve a linear search.</a:t>
             </a:r>
           </a:p>
           <a:p>
             <a:r>
-              <a:rPr lang="en-US" dirty="0" smtClean="0"/>
+              <a:rPr lang="en-US" dirty="0"/>
               <a:t>The transformation we’ll use is called “reduction in strength”, and is a well-known algorithm that compilers use to improve the code in a loop.</a:t>
             </a:r>
-            <a:endParaRPr lang="en-US" dirty="0"/>
           </a:p>
         </p:txBody>
       </p:sp>
@@ -6894,13 +6744,6 @@
   <p:clrMapOvr>
     <a:masterClrMapping/>
   </p:clrMapOvr>
-  <p:timing>
-    <p:tnLst>
-      <p:par>
-        <p:cTn id="1" dur="indefinite" restart="never" nodeType="tmRoot"/>
-      </p:par>
-    </p:tnLst>
-  </p:timing>
 </p:sld>
 </file>
 
@@ -6934,15 +6777,14 @@
         <p:spPr/>
         <p:txBody>
           <a:bodyPr>
-            <a:normAutofit fontScale="90000"/>
+            <a:normAutofit/>
           </a:bodyPr>
           <a:lstStyle/>
           <a:p>
             <a:r>
-              <a:rPr lang="en-US" dirty="0" smtClean="0"/>
-              <a:t>Another example: Integer Square Root</a:t>
-            </a:r>
-            <a:endParaRPr lang="en-US" dirty="0"/>
+              <a:rPr lang="en-US" dirty="0"/>
+              <a:t>Integer Square Root</a:t>
+            </a:r>
           </a:p>
         </p:txBody>
       </p:sp>
@@ -6964,88 +6806,87 @@
           <a:lstStyle/>
           <a:p>
             <a:r>
-              <a:rPr lang="en-US" dirty="0" err="1" smtClean="0"/>
+              <a:rPr lang="en-US" dirty="0" err="1"/>
               <a:t>int-sqrt</a:t>
             </a:r>
             <a:r>
-              <a:rPr lang="en-US" dirty="0" smtClean="0"/>
+              <a:rPr lang="en-US" dirty="0"/>
               <a:t> : Nat -&gt; Nat</a:t>
             </a:r>
           </a:p>
           <a:p>
             <a:r>
-              <a:rPr lang="en-US" dirty="0" smtClean="0"/>
+              <a:rPr lang="en-US" dirty="0"/>
               <a:t>GIVEN: n, </a:t>
             </a:r>
           </a:p>
           <a:p>
             <a:r>
-              <a:rPr lang="en-US" dirty="0" smtClean="0"/>
+              <a:rPr lang="en-US" dirty="0"/>
               <a:t>RETURNS: z such that z² ≤ n &lt; (z+1)²</a:t>
             </a:r>
           </a:p>
           <a:p>
             <a:r>
-              <a:rPr lang="en-US" dirty="0" smtClean="0"/>
+              <a:rPr lang="en-US" dirty="0"/>
               <a:t>examples:</a:t>
             </a:r>
           </a:p>
           <a:p>
             <a:r>
-              <a:rPr lang="en-US" dirty="0" smtClean="0"/>
+              <a:rPr lang="en-US" dirty="0"/>
               <a:t>(</a:t>
             </a:r>
             <a:r>
-              <a:rPr lang="en-US" dirty="0" err="1" smtClean="0"/>
+              <a:rPr lang="en-US" dirty="0" err="1"/>
               <a:t>int-sqrt</a:t>
             </a:r>
             <a:r>
-              <a:rPr lang="en-US" dirty="0" smtClean="0"/>
+              <a:rPr lang="en-US" dirty="0"/>
               <a:t> 25) = 5 </a:t>
             </a:r>
           </a:p>
           <a:p>
             <a:r>
-              <a:rPr lang="en-US" dirty="0" smtClean="0"/>
+              <a:rPr lang="en-US" dirty="0"/>
               <a:t>(</a:t>
             </a:r>
             <a:r>
-              <a:rPr lang="en-US" dirty="0" err="1" smtClean="0"/>
+              <a:rPr lang="en-US" dirty="0" err="1"/>
               <a:t>int-sqrt</a:t>
             </a:r>
             <a:r>
-              <a:rPr lang="en-US" dirty="0" smtClean="0"/>
+              <a:rPr lang="en-US" dirty="0"/>
               <a:t> 26) = 5 ... </a:t>
             </a:r>
           </a:p>
           <a:p>
             <a:r>
-              <a:rPr lang="en-US" dirty="0" smtClean="0"/>
+              <a:rPr lang="en-US" dirty="0"/>
               <a:t>(</a:t>
             </a:r>
             <a:r>
-              <a:rPr lang="en-US" dirty="0" err="1" smtClean="0"/>
+              <a:rPr lang="en-US" dirty="0" err="1"/>
               <a:t>int-sqrt</a:t>
             </a:r>
             <a:r>
-              <a:rPr lang="en-US" dirty="0" smtClean="0"/>
+              <a:rPr lang="en-US" dirty="0"/>
               <a:t> 35) = 5</a:t>
             </a:r>
           </a:p>
           <a:p>
             <a:r>
-              <a:rPr lang="en-US" dirty="0" smtClean="0"/>
+              <a:rPr lang="en-US" dirty="0"/>
               <a:t>(</a:t>
             </a:r>
             <a:r>
-              <a:rPr lang="en-US" dirty="0" err="1" smtClean="0"/>
+              <a:rPr lang="en-US" dirty="0" err="1"/>
               <a:t>int-sqrt</a:t>
             </a:r>
             <a:r>
-              <a:rPr lang="en-US" dirty="0" smtClean="0"/>
+              <a:rPr lang="en-US" dirty="0"/>
               <a:t> 36) = 6</a:t>
             </a:r>
-            <a:endParaRPr lang="en-US" dirty="0"/>
           </a:p>
         </p:txBody>
       </p:sp>
@@ -7088,12 +6929,14 @@
             <a:avLst/>
           </a:prstGeom>
           <a:solidFill>
-            <a:schemeClr val="accent3">
-              <a:lumMod val="40000"/>
-              <a:lumOff val="60000"/>
+            <a:schemeClr val="accent1">
+              <a:lumMod val="20000"/>
+              <a:lumOff val="80000"/>
             </a:schemeClr>
           </a:solidFill>
-          <a:ln/>
+          <a:ln>
+            <a:noFill/>
+          </a:ln>
         </p:spPr>
         <p:style>
           <a:lnRef idx="2">
@@ -7120,7 +6963,7 @@
           <a:p>
             <a:pPr algn="ctr"/>
             <a:r>
-              <a:rPr lang="en-US" dirty="0" smtClean="0">
+              <a:rPr lang="en-US" sz="2400" dirty="0">
                 <a:solidFill>
                   <a:schemeClr val="tx1"/>
                 </a:solidFill>
@@ -7140,13 +6983,6 @@
   <p:clrMapOvr>
     <a:masterClrMapping/>
   </p:clrMapOvr>
-  <p:timing>
-    <p:tnLst>
-      <p:par>
-        <p:cTn id="1" dur="indefinite" restart="never" nodeType="tmRoot"/>
-      </p:par>
-    </p:tnLst>
-  </p:timing>
 </p:sld>
 </file>
 
@@ -7183,10 +7019,9 @@
           <a:lstStyle/>
           <a:p>
             <a:r>
-              <a:rPr lang="en-US" dirty="0" smtClean="0"/>
+              <a:rPr lang="en-US" dirty="0"/>
               <a:t>Video Demonstration</a:t>
             </a:r>
-            <a:endParaRPr lang="en-US" dirty="0"/>
           </a:p>
         </p:txBody>
       </p:sp>
@@ -7208,60 +7043,49 @@
           <a:lstStyle/>
           <a:p>
             <a:r>
-              <a:rPr lang="en-US" dirty="0" smtClean="0"/>
-              <a:t>Watch the video demonstration </a:t>
-            </a:r>
-            <a:r>
               <a:rPr lang="en-US" dirty="0"/>
-              <a:t>at </a:t>
+              <a:t>Watch the video demonstration at </a:t>
             </a:r>
             <a:r>
               <a:rPr lang="en-US" dirty="0">
                 <a:hlinkClick r:id="rId2"/>
               </a:rPr>
-              <a:t>http://</a:t>
-            </a:r>
-            <a:r>
-              <a:rPr lang="en-US" dirty="0" smtClean="0">
-                <a:hlinkClick r:id="rId2"/>
-              </a:rPr>
-              <a:t>www.youtube.com/watch?v=EW66F-vUApE</a:t>
-            </a:r>
-            <a:endParaRPr lang="en-US" dirty="0" smtClean="0"/>
-          </a:p>
-          <a:p>
-            <a:r>
-              <a:rPr lang="en-US" dirty="0" smtClean="0"/>
+              <a:t>http://www.youtube.com/watch?v=EW66F-vUApE</a:t>
+            </a:r>
+            <a:endParaRPr lang="en-US" dirty="0"/>
+          </a:p>
+          <a:p>
+            <a:r>
+              <a:rPr lang="en-US" dirty="0"/>
               <a:t>Note:  the video is a little out of date:</a:t>
             </a:r>
           </a:p>
           <a:p>
             <a:pPr lvl="1"/>
             <a:r>
-              <a:rPr lang="en-US" dirty="0" smtClean="0"/>
+              <a:rPr lang="en-US" dirty="0"/>
               <a:t>it talks about accumulators instead of context arguments</a:t>
             </a:r>
           </a:p>
           <a:p>
             <a:pPr lvl="1"/>
             <a:r>
-              <a:rPr lang="en-US" dirty="0" smtClean="0"/>
+              <a:rPr lang="en-US" dirty="0"/>
               <a:t>the purpose statements are not always up to our current coding standards</a:t>
             </a:r>
           </a:p>
           <a:p>
             <a:pPr lvl="1"/>
             <a:r>
-              <a:rPr lang="en-US" dirty="0" smtClean="0"/>
+              <a:rPr lang="en-US" dirty="0"/>
               <a:t>sorry about that.</a:t>
             </a:r>
           </a:p>
           <a:p>
             <a:r>
-              <a:rPr lang="en-US" dirty="0" smtClean="0"/>
+              <a:rPr lang="en-US" dirty="0"/>
               <a:t>Below are the slides from the video, slightly updated.</a:t>
             </a:r>
-            <a:endParaRPr lang="en-US" dirty="0"/>
           </a:p>
         </p:txBody>
       </p:sp>
@@ -7299,13 +7123,6 @@
   <p:clrMapOvr>
     <a:masterClrMapping/>
   </p:clrMapOvr>
-  <p:timing>
-    <p:tnLst>
-      <p:par>
-        <p:cTn id="1" dur="indefinite" restart="never" nodeType="tmRoot"/>
-      </p:par>
-    </p:tnLst>
-  </p:timing>
 </p:sld>
 </file>
 
@@ -7342,10 +7159,9 @@
           <a:lstStyle/>
           <a:p>
             <a:r>
-              <a:rPr lang="en-US" dirty="0" smtClean="0"/>
+              <a:rPr lang="en-US" dirty="0"/>
               <a:t>int-sqrt.v0</a:t>
             </a:r>
-            <a:endParaRPr lang="en-US" dirty="0"/>
           </a:p>
         </p:txBody>
       </p:sp>
@@ -7372,7 +7188,7 @@
               </a:spcBef>
             </a:pPr>
             <a:r>
-              <a:rPr lang="en-US" sz="2400" dirty="0" smtClean="0"/>
+              <a:rPr lang="en-US" sz="2400" dirty="0"/>
               <a:t>;; STRATEGY: Call more general function</a:t>
             </a:r>
           </a:p>
@@ -7383,7 +7199,7 @@
               </a:spcBef>
             </a:pPr>
             <a:r>
-              <a:rPr lang="en-US" sz="2400" dirty="0" smtClean="0"/>
+              <a:rPr lang="en-US" sz="2400" dirty="0"/>
               <a:t>(define (int-sqrt.v0 n)</a:t>
             </a:r>
           </a:p>
@@ -7394,7 +7210,7 @@
               </a:spcBef>
             </a:pPr>
             <a:r>
-              <a:rPr lang="en-US" sz="2400" dirty="0" smtClean="0"/>
+              <a:rPr lang="en-US" sz="2400" dirty="0"/>
               <a:t>  (linear-search 0 n </a:t>
             </a:r>
           </a:p>
@@ -7405,7 +7221,7 @@
               </a:spcBef>
             </a:pPr>
             <a:r>
-              <a:rPr lang="en-US" sz="2400" dirty="0" smtClean="0"/>
+              <a:rPr lang="en-US" sz="2400" dirty="0"/>
               <a:t>    (lambda (z) </a:t>
             </a:r>
           </a:p>
@@ -7417,21 +7233,16 @@
             </a:pPr>
             <a:r>
               <a:rPr lang="en-US" sz="2400" dirty="0"/>
-              <a:t> </a:t>
-            </a:r>
-            <a:r>
-              <a:rPr lang="en-US" sz="2400" dirty="0" smtClean="0"/>
-              <a:t>     (&lt; n (</a:t>
-            </a:r>
-            <a:r>
-              <a:rPr lang="en-US" sz="2400" dirty="0" err="1" smtClean="0"/>
+              <a:t>      (&lt; n (</a:t>
+            </a:r>
+            <a:r>
+              <a:rPr lang="en-US" sz="2400" dirty="0" err="1"/>
               <a:t>sqr</a:t>
             </a:r>
             <a:r>
-              <a:rPr lang="en-US" sz="2400" dirty="0" smtClean="0"/>
+              <a:rPr lang="en-US" sz="2400" dirty="0"/>
               <a:t> (+ z 1))))))</a:t>
             </a:r>
-            <a:endParaRPr lang="en-US" sz="2400" dirty="0"/>
           </a:p>
         </p:txBody>
       </p:sp>
@@ -7469,13 +7280,6 @@
   <p:clrMapOvr>
     <a:masterClrMapping/>
   </p:clrMapOvr>
-  <p:timing>
-    <p:tnLst>
-      <p:par>
-        <p:cTn id="1" dur="indefinite" restart="never" nodeType="tmRoot"/>
-      </p:par>
-    </p:tnLst>
-  </p:timing>
 </p:sld>
 </file>
 
@@ -7512,10 +7316,9 @@
           <a:lstStyle/>
           <a:p>
             <a:r>
-              <a:rPr lang="en-US" dirty="0" smtClean="0"/>
+              <a:rPr lang="en-US" dirty="0"/>
               <a:t>int-sqrt.v1</a:t>
             </a:r>
-            <a:endParaRPr lang="en-US" dirty="0"/>
           </a:p>
         </p:txBody>
       </p:sp>
@@ -7542,7 +7345,7 @@
               </a:spcBef>
             </a:pPr>
             <a:r>
-              <a:rPr lang="en-US" sz="2400" dirty="0" smtClean="0"/>
+              <a:rPr lang="en-US" sz="2400" dirty="0"/>
               <a:t>(define (int-sqrt.v1 n)</a:t>
             </a:r>
           </a:p>
@@ -7553,7 +7356,7 @@
               </a:spcBef>
             </a:pPr>
             <a:r>
-              <a:rPr lang="en-US" sz="2400" dirty="0" smtClean="0"/>
+              <a:rPr lang="en-US" sz="2400" dirty="0"/>
               <a:t>  (local</a:t>
             </a:r>
           </a:p>
@@ -7564,16 +7367,8 @@
               </a:spcBef>
             </a:pPr>
             <a:r>
-              <a:rPr lang="en-US" sz="2400" dirty="0" smtClean="0"/>
-              <a:t>    ((define </a:t>
-            </a:r>
-            <a:r>
-              <a:rPr lang="en-US" sz="2400" dirty="0" smtClean="0"/>
-              <a:t>(inner-loop </a:t>
-            </a:r>
-            <a:r>
-              <a:rPr lang="en-US" sz="2400" dirty="0" smtClean="0"/>
-              <a:t>z)</a:t>
+              <a:rPr lang="en-US" sz="2400" dirty="0"/>
+              <a:t>    ((define (inner-loop z)</a:t>
             </a:r>
           </a:p>
           <a:p>
@@ -7583,15 +7378,15 @@
               </a:spcBef>
             </a:pPr>
             <a:r>
-              <a:rPr lang="en-US" sz="2400" dirty="0" smtClean="0"/>
+              <a:rPr lang="en-US" sz="2400" dirty="0"/>
               <a:t>       ;; PURPOSE: Returns </a:t>
             </a:r>
             <a:r>
-              <a:rPr lang="en-US" sz="2400" dirty="0" err="1" smtClean="0"/>
+              <a:rPr lang="en-US" sz="2400" dirty="0" err="1"/>
               <a:t>int-sqrt</a:t>
             </a:r>
             <a:r>
-              <a:rPr lang="en-US" sz="2400" dirty="0" smtClean="0"/>
+              <a:rPr lang="en-US" sz="2400" dirty="0"/>
               <a:t>(n)</a:t>
             </a:r>
           </a:p>
@@ -7602,11 +7397,11 @@
               </a:spcBef>
             </a:pPr>
             <a:r>
-              <a:rPr lang="en-US" sz="2400" dirty="0" smtClean="0"/>
+              <a:rPr lang="en-US" sz="2400" dirty="0"/>
               <a:t>       ;; </a:t>
             </a:r>
             <a:r>
-              <a:rPr lang="en-US" sz="2400" dirty="0" smtClean="0">
+              <a:rPr lang="en-US" sz="2400" dirty="0">
                 <a:solidFill>
                   <a:srgbClr val="FF0000"/>
                 </a:solidFill>
@@ -7621,11 +7416,11 @@
               </a:spcBef>
             </a:pPr>
             <a:r>
-              <a:rPr lang="en-US" sz="2400" dirty="0" smtClean="0"/>
+              <a:rPr lang="en-US" sz="2400" dirty="0"/>
               <a:t>       ;; </a:t>
             </a:r>
             <a:r>
-              <a:rPr lang="en-US" sz="2400" dirty="0" smtClean="0">
+              <a:rPr lang="en-US" sz="2400" dirty="0">
                 <a:solidFill>
                   <a:srgbClr val="00B050"/>
                 </a:solidFill>
@@ -7640,14 +7435,14 @@
               </a:spcBef>
             </a:pPr>
             <a:r>
-              <a:rPr lang="en-US" sz="2400" dirty="0" smtClean="0"/>
+              <a:rPr lang="en-US" sz="2400" dirty="0"/>
               <a:t>       (</a:t>
             </a:r>
             <a:r>
-              <a:rPr lang="en-US" sz="2400" dirty="0" err="1" smtClean="0"/>
+              <a:rPr lang="en-US" sz="2400" dirty="0" err="1"/>
               <a:t>cond</a:t>
             </a:r>
-            <a:endParaRPr lang="en-US" sz="2400" dirty="0" smtClean="0"/>
+            <a:endParaRPr lang="en-US" sz="2400" dirty="0"/>
           </a:p>
           <a:p>
             <a:pPr>
@@ -7656,15 +7451,15 @@
               </a:spcBef>
             </a:pPr>
             <a:r>
-              <a:rPr lang="en-US" sz="2400" dirty="0" smtClean="0"/>
+              <a:rPr lang="en-US" sz="2400" dirty="0"/>
               <a:t>         [(&lt; n (</a:t>
             </a:r>
             <a:r>
-              <a:rPr lang="en-US" sz="2400" dirty="0" err="1" smtClean="0"/>
+              <a:rPr lang="en-US" sz="2400" dirty="0" err="1"/>
               <a:t>sqr</a:t>
             </a:r>
             <a:r>
-              <a:rPr lang="en-US" sz="2400" dirty="0" smtClean="0"/>
+              <a:rPr lang="en-US" sz="2400" dirty="0"/>
               <a:t> (+ z 1))) z]</a:t>
             </a:r>
           </a:p>
@@ -7675,16 +7470,8 @@
               </a:spcBef>
             </a:pPr>
             <a:r>
-              <a:rPr lang="en-US" sz="2400" dirty="0" smtClean="0"/>
-              <a:t>         [else </a:t>
-            </a:r>
-            <a:r>
-              <a:rPr lang="en-US" sz="2400" dirty="0" smtClean="0"/>
-              <a:t>(inner-loop (+ </a:t>
-            </a:r>
-            <a:r>
-              <a:rPr lang="en-US" sz="2400" dirty="0" smtClean="0"/>
-              <a:t>z 1))])))</a:t>
+              <a:rPr lang="en-US" sz="2400" dirty="0"/>
+              <a:t>         [else (inner-loop (+ z 1))])))</a:t>
             </a:r>
           </a:p>
           <a:p>
@@ -7694,18 +7481,9 @@
               </a:spcBef>
             </a:pPr>
             <a:r>
-              <a:rPr lang="en-US" sz="2400" dirty="0" smtClean="0"/>
-              <a:t>    </a:t>
-            </a:r>
-            <a:r>
-              <a:rPr lang="en-US" sz="2400" dirty="0" smtClean="0"/>
-              <a:t>(inner-loop </a:t>
-            </a:r>
-            <a:r>
-              <a:rPr lang="en-US" sz="2400" dirty="0" smtClean="0"/>
-              <a:t>0)))</a:t>
-            </a:r>
-            <a:endParaRPr lang="en-US" sz="2400" dirty="0"/>
+              <a:rPr lang="en-US" sz="2400" dirty="0"/>
+              <a:t>    (inner-loop 0)))</a:t>
+            </a:r>
           </a:p>
         </p:txBody>
       </p:sp>
@@ -7761,6 +7539,20 @@
             <a:prstGeom prst="rect">
               <a:avLst/>
             </a:prstGeom>
+            <a:solidFill>
+              <a:schemeClr val="accent1">
+                <a:lumMod val="20000"/>
+                <a:lumOff val="80000"/>
+              </a:schemeClr>
+            </a:solidFill>
+            <a:ln>
+              <a:solidFill>
+                <a:schemeClr val="accent1">
+                  <a:shade val="95000"/>
+                  <a:satMod val="105000"/>
+                </a:schemeClr>
+              </a:solidFill>
+            </a:ln>
           </p:spPr>
           <p:style>
             <a:lnRef idx="1">
@@ -7783,7 +7575,7 @@
             <a:lstStyle/>
             <a:p>
               <a:r>
-                <a:rPr lang="en-US" sz="2400" dirty="0" smtClean="0"/>
+                <a:rPr lang="en-US" sz="2400" dirty="0"/>
                 <a:t>invariant guarantees that the halting measure is non-negative</a:t>
               </a:r>
             </a:p>
@@ -7968,6 +7760,12 @@
           <a:prstGeom prst="rect">
             <a:avLst/>
           </a:prstGeom>
+          <a:solidFill>
+            <a:schemeClr val="accent1">
+              <a:lumMod val="20000"/>
+              <a:lumOff val="80000"/>
+            </a:schemeClr>
+          </a:solidFill>
         </p:spPr>
         <p:style>
           <a:lnRef idx="1">
@@ -7990,34 +7788,10 @@
           <a:lstStyle/>
           <a:p>
             <a:r>
-              <a:rPr lang="en-US" dirty="0" smtClean="0"/>
-              <a:t>we just checked that </a:t>
-            </a:r>
-            <a:r>
               <a:rPr lang="en-US" dirty="0"/>
-              <a:t>(z+1)²</a:t>
-            </a:r>
-            <a:r>
-              <a:rPr lang="en-US" dirty="0" smtClean="0"/>
-              <a:t> </a:t>
-            </a:r>
-            <a:r>
-              <a:rPr lang="en-US" dirty="0"/>
-              <a:t>≤ </a:t>
-            </a:r>
-            <a:r>
-              <a:rPr lang="en-US" dirty="0" smtClean="0"/>
-              <a:t>n, so calling </a:t>
-            </a:r>
-            <a:r>
-              <a:rPr lang="en-US" dirty="0" smtClean="0"/>
-              <a:t>inner-loop </a:t>
-            </a:r>
-            <a:r>
-              <a:rPr lang="en-US" dirty="0" smtClean="0"/>
-              <a:t>with z+1 satisfies the invariant.</a:t>
-            </a:r>
-            <a:endParaRPr lang="en-US" sz="2400" dirty="0" smtClean="0"/>
+              <a:t>we just checked that (z+1)² ≤ n, so calling inner-loop with z+1 satisfies the invariant.</a:t>
+            </a:r>
+            <a:endParaRPr lang="en-US" sz="2400" dirty="0"/>
           </a:p>
         </p:txBody>
       </p:sp>
@@ -8307,10 +8081,9 @@
           <a:lstStyle/>
           <a:p>
             <a:r>
-              <a:rPr lang="en-US" dirty="0" smtClean="0"/>
+              <a:rPr lang="en-US" dirty="0"/>
               <a:t>A picture of this invariant</a:t>
             </a:r>
-            <a:endParaRPr lang="en-US" dirty="0"/>
           </a:p>
         </p:txBody>
       </p:sp>
@@ -8405,16 +8178,12 @@
           <a:lstStyle/>
           <a:p>
             <a:r>
-              <a:rPr lang="en-US" sz="2400" b="1" dirty="0" smtClean="0">
+              <a:rPr lang="en-US" sz="2400" b="1" dirty="0">
                 <a:latin typeface="Consolas" pitchFamily="49" charset="0"/>
                 <a:cs typeface="Consolas" pitchFamily="49" charset="0"/>
               </a:rPr>
               <a:t>0</a:t>
             </a:r>
-            <a:endParaRPr lang="en-US" sz="2400" b="1" dirty="0">
-              <a:latin typeface="Consolas" pitchFamily="49" charset="0"/>
-              <a:cs typeface="Consolas" pitchFamily="49" charset="0"/>
-            </a:endParaRPr>
           </a:p>
         </p:txBody>
       </p:sp>
@@ -8441,16 +8210,12 @@
           <a:lstStyle/>
           <a:p>
             <a:r>
-              <a:rPr lang="en-US" sz="2400" b="1" dirty="0" smtClean="0">
+              <a:rPr lang="en-US" sz="2400" b="1" dirty="0">
                 <a:latin typeface="Consolas" pitchFamily="49" charset="0"/>
                 <a:cs typeface="Consolas" pitchFamily="49" charset="0"/>
               </a:rPr>
               <a:t>N</a:t>
             </a:r>
-            <a:endParaRPr lang="en-US" sz="2400" b="1" dirty="0">
-              <a:latin typeface="Consolas" pitchFamily="49" charset="0"/>
-              <a:cs typeface="Consolas" pitchFamily="49" charset="0"/>
-            </a:endParaRPr>
           </a:p>
         </p:txBody>
       </p:sp>
@@ -8512,16 +8277,12 @@
           <a:lstStyle/>
           <a:p>
             <a:r>
-              <a:rPr lang="en-US" sz="2400" b="1" dirty="0" smtClean="0">
+              <a:rPr lang="en-US" sz="2400" b="1" dirty="0">
                 <a:latin typeface="Consolas" pitchFamily="49" charset="0"/>
                 <a:cs typeface="Consolas" pitchFamily="49" charset="0"/>
               </a:rPr>
               <a:t>z </a:t>
             </a:r>
-            <a:endParaRPr lang="en-US" sz="2400" b="1" dirty="0">
-              <a:latin typeface="Consolas" pitchFamily="49" charset="0"/>
-              <a:cs typeface="Consolas" pitchFamily="49" charset="0"/>
-            </a:endParaRPr>
           </a:p>
         </p:txBody>
       </p:sp>
@@ -8550,10 +8311,9 @@
           <a:lstStyle/>
           <a:p>
             <a:r>
-              <a:rPr lang="en-US" sz="2400" dirty="0" smtClean="0"/>
+              <a:rPr lang="en-US" sz="2400" dirty="0"/>
               <a:t>INVARIANT: z² ≤ n</a:t>
             </a:r>
-            <a:endParaRPr lang="en-US" sz="2400" dirty="0"/>
           </a:p>
         </p:txBody>
       </p:sp>
@@ -8571,6 +8331,12 @@
           <a:prstGeom prst="rect">
             <a:avLst/>
           </a:prstGeom>
+          <a:solidFill>
+            <a:schemeClr val="accent2">
+              <a:lumMod val="20000"/>
+              <a:lumOff val="80000"/>
+            </a:schemeClr>
+          </a:solidFill>
         </p:spPr>
         <p:style>
           <a:lnRef idx="1">
@@ -8593,16 +8359,8 @@
           <a:lstStyle/>
           <a:p>
             <a:r>
-              <a:rPr lang="en-US" dirty="0" smtClean="0"/>
-              <a:t>all these numbers also have squares that are </a:t>
-            </a:r>
-            <a:r>
               <a:rPr lang="en-US" dirty="0"/>
-              <a:t>≤ </a:t>
-            </a:r>
-            <a:r>
-              <a:rPr lang="en-US" dirty="0" smtClean="0"/>
-              <a:t>n</a:t>
+              <a:t>all these numbers also have squares that are ≤ n</a:t>
             </a:r>
           </a:p>
         </p:txBody>
@@ -8655,13 +8413,6 @@
   <p:clrMapOvr>
     <a:masterClrMapping/>
   </p:clrMapOvr>
-  <p:timing>
-    <p:tnLst>
-      <p:par>
-        <p:cTn id="1" dur="indefinite" restart="never" nodeType="tmRoot"/>
-      </p:par>
-    </p:tnLst>
-  </p:timing>
 </p:sld>
 </file>
 
@@ -8700,10 +8451,9 @@
           <a:lstStyle/>
           <a:p>
             <a:r>
-              <a:rPr lang="en-US" dirty="0" smtClean="0"/>
+              <a:rPr lang="en-US" dirty="0"/>
               <a:t>What happens at the recursive call?</a:t>
             </a:r>
-            <a:endParaRPr lang="en-US" dirty="0"/>
           </a:p>
         </p:txBody>
       </p:sp>
@@ -8864,16 +8614,12 @@
             <a:lstStyle/>
             <a:p>
               <a:r>
-                <a:rPr lang="en-US" sz="2400" b="1" dirty="0" smtClean="0">
+                <a:rPr lang="en-US" sz="2400" b="1" dirty="0">
                   <a:latin typeface="Consolas" pitchFamily="49" charset="0"/>
                   <a:cs typeface="Consolas" pitchFamily="49" charset="0"/>
                 </a:rPr>
                 <a:t>0</a:t>
               </a:r>
-              <a:endParaRPr lang="en-US" sz="2400" b="1" dirty="0">
-                <a:latin typeface="Consolas" pitchFamily="49" charset="0"/>
-                <a:cs typeface="Consolas" pitchFamily="49" charset="0"/>
-              </a:endParaRPr>
             </a:p>
           </p:txBody>
         </p:sp>
@@ -8900,16 +8646,12 @@
             <a:lstStyle/>
             <a:p>
               <a:r>
-                <a:rPr lang="en-US" sz="2400" b="1" dirty="0" smtClean="0">
+                <a:rPr lang="en-US" sz="2400" b="1" dirty="0">
                   <a:latin typeface="Consolas" pitchFamily="49" charset="0"/>
                   <a:cs typeface="Consolas" pitchFamily="49" charset="0"/>
                 </a:rPr>
                 <a:t>N</a:t>
               </a:r>
-              <a:endParaRPr lang="en-US" sz="2400" b="1" dirty="0">
-                <a:latin typeface="Consolas" pitchFamily="49" charset="0"/>
-                <a:cs typeface="Consolas" pitchFamily="49" charset="0"/>
-              </a:endParaRPr>
             </a:p>
           </p:txBody>
         </p:sp>
@@ -8971,16 +8713,12 @@
             <a:lstStyle/>
             <a:p>
               <a:r>
-                <a:rPr lang="en-US" sz="2400" b="1" dirty="0" smtClean="0">
+                <a:rPr lang="en-US" sz="2400" b="1" dirty="0">
                   <a:latin typeface="Consolas" pitchFamily="49" charset="0"/>
                   <a:cs typeface="Consolas" pitchFamily="49" charset="0"/>
                 </a:rPr>
                 <a:t>z </a:t>
               </a:r>
-              <a:endParaRPr lang="en-US" sz="2400" b="1" dirty="0">
-                <a:latin typeface="Consolas" pitchFamily="49" charset="0"/>
-                <a:cs typeface="Consolas" pitchFamily="49" charset="0"/>
-              </a:endParaRPr>
             </a:p>
           </p:txBody>
         </p:sp>
@@ -9010,10 +8748,9 @@
           <a:lstStyle/>
           <a:p>
             <a:r>
-              <a:rPr lang="en-US" sz="2400" dirty="0" smtClean="0"/>
+              <a:rPr lang="en-US" sz="2400" dirty="0"/>
               <a:t>INVARIANT: z² ≤ n</a:t>
             </a:r>
-            <a:endParaRPr lang="en-US" sz="2400" dirty="0"/>
           </a:p>
         </p:txBody>
       </p:sp>
@@ -9059,16 +8796,8 @@
           <a:lstStyle/>
           <a:p>
             <a:r>
-              <a:rPr lang="en-US" dirty="0" smtClean="0"/>
-              <a:t>all these numbers also have squares that are </a:t>
-            </a:r>
-            <a:r>
               <a:rPr lang="en-US" dirty="0"/>
-              <a:t>≤ </a:t>
-            </a:r>
-            <a:r>
-              <a:rPr lang="en-US" dirty="0" smtClean="0"/>
-              <a:t>n</a:t>
+              <a:t>all these numbers also have squares that are ≤ n</a:t>
             </a:r>
           </a:p>
         </p:txBody>
@@ -9136,10 +8865,9 @@
           <a:lstStyle/>
           <a:p>
             <a:r>
-              <a:rPr lang="en-US" sz="2400" dirty="0" smtClean="0"/>
+              <a:rPr lang="en-US" sz="2400" dirty="0"/>
               <a:t>CONDITION: (z+1)² ≤ n</a:t>
             </a:r>
-            <a:endParaRPr lang="en-US" sz="2400" dirty="0"/>
           </a:p>
         </p:txBody>
       </p:sp>
@@ -9276,16 +9004,12 @@
             <a:lstStyle/>
             <a:p>
               <a:r>
-                <a:rPr lang="en-US" sz="2400" b="1" dirty="0" smtClean="0">
+                <a:rPr lang="en-US" sz="2400" b="1" dirty="0">
                   <a:latin typeface="Consolas" pitchFamily="49" charset="0"/>
                   <a:cs typeface="Consolas" pitchFamily="49" charset="0"/>
                 </a:rPr>
                 <a:t>0</a:t>
               </a:r>
-              <a:endParaRPr lang="en-US" sz="2400" b="1" dirty="0">
-                <a:latin typeface="Consolas" pitchFamily="49" charset="0"/>
-                <a:cs typeface="Consolas" pitchFamily="49" charset="0"/>
-              </a:endParaRPr>
             </a:p>
           </p:txBody>
         </p:sp>
@@ -9312,16 +9036,12 @@
             <a:lstStyle/>
             <a:p>
               <a:r>
-                <a:rPr lang="en-US" sz="2400" b="1" dirty="0" smtClean="0">
+                <a:rPr lang="en-US" sz="2400" b="1" dirty="0">
                   <a:latin typeface="Consolas" pitchFamily="49" charset="0"/>
                   <a:cs typeface="Consolas" pitchFamily="49" charset="0"/>
                 </a:rPr>
                 <a:t>N</a:t>
               </a:r>
-              <a:endParaRPr lang="en-US" sz="2400" b="1" dirty="0">
-                <a:latin typeface="Consolas" pitchFamily="49" charset="0"/>
-                <a:cs typeface="Consolas" pitchFamily="49" charset="0"/>
-              </a:endParaRPr>
             </a:p>
           </p:txBody>
         </p:sp>
@@ -9348,23 +9068,19 @@
             <a:lstStyle/>
             <a:p>
               <a:r>
-                <a:rPr lang="en-US" sz="2400" b="1" dirty="0" err="1" smtClean="0">
+                <a:rPr lang="en-US" sz="2400" b="1" dirty="0" err="1">
                   <a:latin typeface="Consolas" pitchFamily="49" charset="0"/>
                   <a:cs typeface="Consolas" pitchFamily="49" charset="0"/>
                 </a:rPr>
                 <a:t>z_new</a:t>
               </a:r>
               <a:r>
-                <a:rPr lang="en-US" sz="2400" b="1" dirty="0" smtClean="0">
+                <a:rPr lang="en-US" sz="2400" b="1" dirty="0">
                   <a:latin typeface="Consolas" pitchFamily="49" charset="0"/>
                   <a:cs typeface="Consolas" pitchFamily="49" charset="0"/>
                 </a:rPr>
                 <a:t> = z+1</a:t>
               </a:r>
-              <a:endParaRPr lang="en-US" sz="2400" b="1" dirty="0">
-                <a:latin typeface="Consolas" pitchFamily="49" charset="0"/>
-                <a:cs typeface="Consolas" pitchFamily="49" charset="0"/>
-              </a:endParaRPr>
             </a:p>
           </p:txBody>
         </p:sp>
@@ -9502,16 +9218,12 @@
             <a:lstStyle/>
             <a:p>
               <a:r>
-                <a:rPr lang="en-US" sz="2400" b="1" dirty="0" smtClean="0">
+                <a:rPr lang="en-US" sz="2400" b="1" dirty="0">
                   <a:latin typeface="Consolas" pitchFamily="49" charset="0"/>
                   <a:cs typeface="Consolas" pitchFamily="49" charset="0"/>
                 </a:rPr>
                 <a:t>0</a:t>
               </a:r>
-              <a:endParaRPr lang="en-US" sz="2400" b="1" dirty="0">
-                <a:latin typeface="Consolas" pitchFamily="49" charset="0"/>
-                <a:cs typeface="Consolas" pitchFamily="49" charset="0"/>
-              </a:endParaRPr>
             </a:p>
           </p:txBody>
         </p:sp>
@@ -9538,16 +9250,12 @@
             <a:lstStyle/>
             <a:p>
               <a:r>
-                <a:rPr lang="en-US" sz="2400" b="1" dirty="0" smtClean="0">
+                <a:rPr lang="en-US" sz="2400" b="1" dirty="0">
                   <a:latin typeface="Consolas" pitchFamily="49" charset="0"/>
                   <a:cs typeface="Consolas" pitchFamily="49" charset="0"/>
                 </a:rPr>
                 <a:t>N</a:t>
               </a:r>
-              <a:endParaRPr lang="en-US" sz="2400" b="1" dirty="0">
-                <a:latin typeface="Consolas" pitchFamily="49" charset="0"/>
-                <a:cs typeface="Consolas" pitchFamily="49" charset="0"/>
-              </a:endParaRPr>
             </a:p>
           </p:txBody>
         </p:sp>
@@ -9609,16 +9317,12 @@
             <a:lstStyle/>
             <a:p>
               <a:r>
-                <a:rPr lang="en-US" sz="2400" b="1" dirty="0" smtClean="0">
+                <a:rPr lang="en-US" sz="2400" b="1" dirty="0">
                   <a:latin typeface="Consolas" pitchFamily="49" charset="0"/>
                   <a:cs typeface="Consolas" pitchFamily="49" charset="0"/>
                 </a:rPr>
                 <a:t>z </a:t>
               </a:r>
-              <a:endParaRPr lang="en-US" sz="2400" b="1" dirty="0">
-                <a:latin typeface="Consolas" pitchFamily="49" charset="0"/>
-                <a:cs typeface="Consolas" pitchFamily="49" charset="0"/>
-              </a:endParaRPr>
             </a:p>
           </p:txBody>
         </p:sp>
@@ -9686,10 +9390,9 @@
           <a:lstStyle/>
           <a:p>
             <a:r>
-              <a:rPr lang="en-US" sz="2400" dirty="0" smtClean="0"/>
+              <a:rPr lang="en-US" sz="2400" dirty="0"/>
               <a:t>INVARIANT z² ≤ n: true again for the new value of z.</a:t>
             </a:r>
-            <a:endParaRPr lang="en-US" sz="2400" dirty="0"/>
           </a:p>
         </p:txBody>
       </p:sp>
@@ -10064,10 +9767,9 @@
           <a:lstStyle/>
           <a:p>
             <a:r>
-              <a:rPr lang="en-US" dirty="0" smtClean="0"/>
+              <a:rPr lang="en-US" dirty="0"/>
               <a:t>Improving this code</a:t>
             </a:r>
-            <a:endParaRPr lang="en-US" dirty="0"/>
           </a:p>
         </p:txBody>
       </p:sp>
@@ -10089,19 +9791,19 @@
           <a:lstStyle/>
           <a:p>
             <a:r>
-              <a:rPr lang="en-US" b="0" dirty="0" smtClean="0">
+              <a:rPr lang="en-US" b="0" dirty="0">
                 <a:latin typeface="+mn-lt"/>
               </a:rPr>
               <a:t>Don't like to do </a:t>
             </a:r>
             <a:r>
-              <a:rPr lang="en-US" dirty="0" err="1" smtClean="0">
+              <a:rPr lang="en-US" dirty="0" err="1">
                 <a:latin typeface="+mn-lt"/>
               </a:rPr>
               <a:t>sqr</a:t>
             </a:r>
             <a:r>
-              <a:rPr lang="en-US" b="0" dirty="0" smtClean="0">
+              <a:rPr lang="en-US" b="0" dirty="0">
                 <a:latin typeface="+mn-lt"/>
               </a:rPr>
               <a:t> at every step, so let's keep the value of </a:t>
@@ -10109,33 +9811,33 @@
           </a:p>
           <a:p>
             <a:r>
-              <a:rPr lang="en-US" dirty="0" smtClean="0"/>
+              <a:rPr lang="en-US" dirty="0"/>
               <a:t>(</a:t>
             </a:r>
             <a:r>
-              <a:rPr lang="en-US" dirty="0" err="1" smtClean="0"/>
+              <a:rPr lang="en-US" dirty="0" err="1"/>
               <a:t>sqr</a:t>
             </a:r>
             <a:r>
-              <a:rPr lang="en-US" dirty="0" smtClean="0"/>
+              <a:rPr lang="en-US" dirty="0"/>
               <a:t> (+ z 1)) </a:t>
             </a:r>
           </a:p>
           <a:p>
             <a:r>
-              <a:rPr lang="en-US" b="0" dirty="0" smtClean="0">
+              <a:rPr lang="en-US" b="0" dirty="0">
                 <a:latin typeface="+mn-lt"/>
               </a:rPr>
               <a:t>in a context argument, which we'll call </a:t>
             </a:r>
             <a:r>
-              <a:rPr lang="en-US" dirty="0" smtClean="0">
+              <a:rPr lang="en-US" dirty="0">
                 <a:latin typeface="+mn-lt"/>
               </a:rPr>
               <a:t>u</a:t>
             </a:r>
             <a:r>
-              <a:rPr lang="en-US" b="0" dirty="0" smtClean="0">
+              <a:rPr lang="en-US" b="0" dirty="0">
                 <a:latin typeface="+mn-lt"/>
               </a:rPr>
               <a:t>.</a:t>
@@ -10143,45 +9845,44 @@
           </a:p>
           <a:p>
             <a:r>
-              <a:rPr lang="en-US" b="0" dirty="0" smtClean="0">
+              <a:rPr lang="en-US" b="0" dirty="0">
                 <a:latin typeface="+mn-lt"/>
               </a:rPr>
               <a:t>Compute new value of u as follows:</a:t>
             </a:r>
           </a:p>
           <a:p>
-            <a:endParaRPr lang="en-US" dirty="0" smtClean="0"/>
-          </a:p>
-          <a:p>
-            <a:r>
-              <a:rPr lang="en-US" dirty="0" smtClean="0"/>
+            <a:endParaRPr lang="en-US" dirty="0"/>
+          </a:p>
+          <a:p>
+            <a:r>
+              <a:rPr lang="en-US" dirty="0"/>
               <a:t>z' = (z+1)</a:t>
             </a:r>
           </a:p>
           <a:p>
             <a:r>
-              <a:rPr lang="en-US" dirty="0" smtClean="0"/>
+              <a:rPr lang="en-US" dirty="0"/>
               <a:t>u' = (z'+1)*(z'+1)</a:t>
             </a:r>
           </a:p>
           <a:p>
             <a:r>
-              <a:rPr lang="en-US" dirty="0" smtClean="0"/>
+              <a:rPr lang="en-US" dirty="0"/>
               <a:t>   = ((z+1)+1)*((z+1)+1)</a:t>
             </a:r>
           </a:p>
           <a:p>
             <a:r>
-              <a:rPr lang="en-US" dirty="0" smtClean="0"/>
+              <a:rPr lang="en-US" dirty="0"/>
               <a:t>   = (z+1)² + 2(z+1) + 1</a:t>
             </a:r>
           </a:p>
           <a:p>
             <a:r>
-              <a:rPr lang="en-US" dirty="0" smtClean="0"/>
+              <a:rPr lang="en-US" dirty="0"/>
               <a:t>   = u      + 2z + 3</a:t>
             </a:r>
-            <a:endParaRPr lang="en-US" dirty="0"/>
           </a:p>
         </p:txBody>
       </p:sp>
@@ -10219,13 +9920,6 @@
   <p:clrMapOvr>
     <a:masterClrMapping/>
   </p:clrMapOvr>
-  <p:timing>
-    <p:tnLst>
-      <p:par>
-        <p:cTn id="1" dur="indefinite" restart="never" nodeType="tmRoot"/>
-      </p:par>
-    </p:tnLst>
-  </p:timing>
 </p:sld>
 </file>
 

</xml_diff>